<commit_message>
first version of GenVisR lecture
</commit_message>
<xml_diff>
--- a/lectures/GenViz_Module3_Lecture.pptx
+++ b/lectures/GenViz_Module3_Lecture.pptx
@@ -5,16 +5,31 @@
     <p:sldMasterId id="2147483648" r:id="rId1"/>
   </p:sldMasterIdLst>
   <p:notesMasterIdLst>
-    <p:notesMasterId r:id="rId6"/>
+    <p:notesMasterId r:id="rId21"/>
   </p:notesMasterIdLst>
   <p:handoutMasterIdLst>
-    <p:handoutMasterId r:id="rId7"/>
+    <p:handoutMasterId r:id="rId22"/>
   </p:handoutMasterIdLst>
   <p:sldIdLst>
     <p:sldId id="256" r:id="rId2"/>
-    <p:sldId id="259" r:id="rId3"/>
-    <p:sldId id="260" r:id="rId4"/>
-    <p:sldId id="257" r:id="rId5"/>
+    <p:sldId id="260" r:id="rId3"/>
+    <p:sldId id="257" r:id="rId4"/>
+    <p:sldId id="275" r:id="rId5"/>
+    <p:sldId id="276" r:id="rId6"/>
+    <p:sldId id="261" r:id="rId7"/>
+    <p:sldId id="262" r:id="rId8"/>
+    <p:sldId id="263" r:id="rId9"/>
+    <p:sldId id="264" r:id="rId10"/>
+    <p:sldId id="265" r:id="rId11"/>
+    <p:sldId id="266" r:id="rId12"/>
+    <p:sldId id="267" r:id="rId13"/>
+    <p:sldId id="268" r:id="rId14"/>
+    <p:sldId id="269" r:id="rId15"/>
+    <p:sldId id="270" r:id="rId16"/>
+    <p:sldId id="271" r:id="rId17"/>
+    <p:sldId id="272" r:id="rId18"/>
+    <p:sldId id="273" r:id="rId19"/>
+    <p:sldId id="274" r:id="rId20"/>
   </p:sldIdLst>
   <p:sldSz cx="9144000" cy="6858000" type="screen4x3"/>
   <p:notesSz cx="6858000" cy="9144000"/>
@@ -115,7 +130,7 @@
   </p:defaultTextStyle>
   <p:extLst>
     <p:ext uri="{EFAFB233-063F-42B5-8137-9DF3F51BA10A}">
-      <p15:sldGuideLst xmlns:p15="http://schemas.microsoft.com/office/powerpoint/2012/main" xmlns="">
+      <p15:sldGuideLst xmlns="" xmlns:p15="http://schemas.microsoft.com/office/powerpoint/2012/main">
         <p15:guide id="1" orient="horz" pos="2160">
           <p15:clr>
             <a:srgbClr val="A4A3A4"/>
@@ -215,7 +230,7 @@
             <a:fld id="{03643E35-CD80-874A-A3D7-254E954BB753}" type="datetimeFigureOut">
               <a:rPr lang="en-US" smtClean="0"/>
               <a:pPr/>
-              <a:t>8/25/17</a:t>
+              <a:t>8/31/17</a:t>
             </a:fld>
             <a:endParaRPr lang="en-US"/>
           </a:p>
@@ -382,7 +397,7 @@
             <a:fld id="{5C416C15-7665-174C-99B8-5B237ACA6582}" type="datetimeFigureOut">
               <a:rPr lang="en-US" smtClean="0"/>
               <a:pPr/>
-              <a:t>8/25/17</a:t>
+              <a:t>8/31/17</a:t>
             </a:fld>
             <a:endParaRPr lang="en-US"/>
           </a:p>
@@ -697,70 +712,6 @@
           <a:bodyPr/>
           <a:lstStyle/>
           <a:p>
-            <a:pPr marL="171450" indent="-171450">
-              <a:buFontTx/>
-              <a:buChar char="•"/>
-            </a:pPr>
-            <a:r>
-              <a:rPr lang="en-US" dirty="0" smtClean="0"/>
-              <a:t>Note there</a:t>
-            </a:r>
-            <a:r>
-              <a:rPr lang="en-US" baseline="0" dirty="0" smtClean="0"/>
-              <a:t> are two licenses if effect for this course. </a:t>
-            </a:r>
-          </a:p>
-          <a:p>
-            <a:pPr marL="628650" lvl="1" indent="-171450">
-              <a:buFontTx/>
-              <a:buChar char="•"/>
-            </a:pPr>
-            <a:r>
-              <a:rPr lang="en-US" baseline="0" dirty="0" smtClean="0"/>
-              <a:t>All *content* (lectures, written materials, etc.) are made available under the Creative Commons Attribution-</a:t>
-            </a:r>
-            <a:r>
-              <a:rPr lang="en-US" baseline="0" dirty="0" err="1" smtClean="0"/>
-              <a:t>ShareAlike</a:t>
-            </a:r>
-            <a:r>
-              <a:rPr lang="en-US" baseline="0" dirty="0" smtClean="0"/>
-              <a:t> 4.0 International (CC BY-SA 4.0). (https://</a:t>
-            </a:r>
-            <a:r>
-              <a:rPr lang="en-US" baseline="0" dirty="0" err="1" smtClean="0"/>
-              <a:t>creativecommons.org</a:t>
-            </a:r>
-            <a:r>
-              <a:rPr lang="en-US" baseline="0" dirty="0" smtClean="0"/>
-              <a:t>/licenses/by-</a:t>
-            </a:r>
-            <a:r>
-              <a:rPr lang="en-US" baseline="0" dirty="0" err="1" smtClean="0"/>
-              <a:t>sa</a:t>
-            </a:r>
-            <a:r>
-              <a:rPr lang="en-US" baseline="0" dirty="0" smtClean="0"/>
-              <a:t>/4.0/).</a:t>
-            </a:r>
-          </a:p>
-          <a:p>
-            <a:pPr marL="628650" lvl="1" indent="-171450">
-              <a:buFontTx/>
-              <a:buChar char="•"/>
-            </a:pPr>
-            <a:r>
-              <a:rPr lang="en-US" baseline="0" dirty="0" smtClean="0"/>
-              <a:t>All *code* (R scripts the website code itself) are made available under the MIT License (https://</a:t>
-            </a:r>
-            <a:r>
-              <a:rPr lang="en-US" baseline="0" dirty="0" err="1" smtClean="0"/>
-              <a:t>opensource.org</a:t>
-            </a:r>
-            <a:r>
-              <a:rPr lang="en-US" baseline="0" dirty="0" smtClean="0"/>
-              <a:t>/licenses/MIT).</a:t>
-            </a:r>
             <a:endParaRPr lang="en-US" dirty="0"/>
           </a:p>
         </p:txBody>
@@ -783,7 +734,7 @@
             <a:fld id="{F9BF1BD6-11A6-594E-AFA1-283323A41F72}" type="slidenum">
               <a:rPr lang="en-US" smtClean="0"/>
               <a:pPr/>
-              <a:t>2</a:t>
+              <a:t>7</a:t>
             </a:fld>
             <a:endParaRPr lang="en-US"/>
           </a:p>
@@ -792,7 +743,177 @@
     </p:spTree>
     <p:extLst>
       <p:ext uri="{BB962C8B-B14F-4D97-AF65-F5344CB8AC3E}">
-        <p14:creationId xmlns:p14="http://schemas.microsoft.com/office/powerpoint/2010/main" val="3848496354"/>
+        <p14:creationId xmlns:p14="http://schemas.microsoft.com/office/powerpoint/2010/main" val="3509994250"/>
+      </p:ext>
+    </p:extLst>
+  </p:cSld>
+  <p:clrMapOvr>
+    <a:masterClrMapping/>
+  </p:clrMapOvr>
+</p:notes>
+</file>
+
+<file path=ppt/notesSlides/notesSlide2.xml><?xml version="1.0" encoding="utf-8"?>
+<p:notes xmlns:a="http://schemas.openxmlformats.org/drawingml/2006/main" xmlns:r="http://schemas.openxmlformats.org/officeDocument/2006/relationships" xmlns:p="http://schemas.openxmlformats.org/presentationml/2006/main">
+  <p:cSld>
+    <p:spTree>
+      <p:nvGrpSpPr>
+        <p:cNvPr id="1" name=""/>
+        <p:cNvGrpSpPr/>
+        <p:nvPr/>
+      </p:nvGrpSpPr>
+      <p:grpSpPr>
+        <a:xfrm>
+          <a:off x="0" y="0"/>
+          <a:ext cx="0" cy="0"/>
+          <a:chOff x="0" y="0"/>
+          <a:chExt cx="0" cy="0"/>
+        </a:xfrm>
+      </p:grpSpPr>
+      <p:sp>
+        <p:nvSpPr>
+          <p:cNvPr id="2" name="Slide Image Placeholder 1"/>
+          <p:cNvSpPr>
+            <a:spLocks noGrp="1" noRot="1" noChangeAspect="1"/>
+          </p:cNvSpPr>
+          <p:nvPr>
+            <p:ph type="sldImg"/>
+          </p:nvPr>
+        </p:nvSpPr>
+        <p:spPr/>
+      </p:sp>
+      <p:sp>
+        <p:nvSpPr>
+          <p:cNvPr id="3" name="Notes Placeholder 2"/>
+          <p:cNvSpPr>
+            <a:spLocks noGrp="1"/>
+          </p:cNvSpPr>
+          <p:nvPr>
+            <p:ph type="body" idx="1"/>
+          </p:nvPr>
+        </p:nvSpPr>
+        <p:spPr/>
+        <p:txBody>
+          <a:bodyPr/>
+          <a:lstStyle/>
+          <a:p>
+            <a:endParaRPr lang="en-US" dirty="0"/>
+          </a:p>
+        </p:txBody>
+      </p:sp>
+      <p:sp>
+        <p:nvSpPr>
+          <p:cNvPr id="4" name="Slide Number Placeholder 3"/>
+          <p:cNvSpPr>
+            <a:spLocks noGrp="1"/>
+          </p:cNvSpPr>
+          <p:nvPr>
+            <p:ph type="sldNum" sz="quarter" idx="10"/>
+          </p:nvPr>
+        </p:nvSpPr>
+        <p:spPr/>
+        <p:txBody>
+          <a:bodyPr/>
+          <a:lstStyle/>
+          <a:p>
+            <a:fld id="{F9BF1BD6-11A6-594E-AFA1-283323A41F72}" type="slidenum">
+              <a:rPr lang="en-US" smtClean="0"/>
+              <a:pPr/>
+              <a:t>9</a:t>
+            </a:fld>
+            <a:endParaRPr lang="en-US"/>
+          </a:p>
+        </p:txBody>
+      </p:sp>
+    </p:spTree>
+    <p:extLst>
+      <p:ext uri="{BB962C8B-B14F-4D97-AF65-F5344CB8AC3E}">
+        <p14:creationId xmlns:p14="http://schemas.microsoft.com/office/powerpoint/2010/main" val="1535439783"/>
+      </p:ext>
+    </p:extLst>
+  </p:cSld>
+  <p:clrMapOvr>
+    <a:masterClrMapping/>
+  </p:clrMapOvr>
+</p:notes>
+</file>
+
+<file path=ppt/notesSlides/notesSlide3.xml><?xml version="1.0" encoding="utf-8"?>
+<p:notes xmlns:a="http://schemas.openxmlformats.org/drawingml/2006/main" xmlns:r="http://schemas.openxmlformats.org/officeDocument/2006/relationships" xmlns:p="http://schemas.openxmlformats.org/presentationml/2006/main">
+  <p:cSld>
+    <p:spTree>
+      <p:nvGrpSpPr>
+        <p:cNvPr id="1" name=""/>
+        <p:cNvGrpSpPr/>
+        <p:nvPr/>
+      </p:nvGrpSpPr>
+      <p:grpSpPr>
+        <a:xfrm>
+          <a:off x="0" y="0"/>
+          <a:ext cx="0" cy="0"/>
+          <a:chOff x="0" y="0"/>
+          <a:chExt cx="0" cy="0"/>
+        </a:xfrm>
+      </p:grpSpPr>
+      <p:sp>
+        <p:nvSpPr>
+          <p:cNvPr id="2" name="Slide Image Placeholder 1"/>
+          <p:cNvSpPr>
+            <a:spLocks noGrp="1" noRot="1" noChangeAspect="1"/>
+          </p:cNvSpPr>
+          <p:nvPr>
+            <p:ph type="sldImg"/>
+          </p:nvPr>
+        </p:nvSpPr>
+        <p:spPr/>
+      </p:sp>
+      <p:sp>
+        <p:nvSpPr>
+          <p:cNvPr id="3" name="Notes Placeholder 2"/>
+          <p:cNvSpPr>
+            <a:spLocks noGrp="1"/>
+          </p:cNvSpPr>
+          <p:nvPr>
+            <p:ph type="body" idx="1"/>
+          </p:nvPr>
+        </p:nvSpPr>
+        <p:spPr/>
+        <p:txBody>
+          <a:bodyPr/>
+          <a:lstStyle/>
+          <a:p>
+            <a:endParaRPr lang="en-US" dirty="0"/>
+          </a:p>
+        </p:txBody>
+      </p:sp>
+      <p:sp>
+        <p:nvSpPr>
+          <p:cNvPr id="4" name="Slide Number Placeholder 3"/>
+          <p:cNvSpPr>
+            <a:spLocks noGrp="1"/>
+          </p:cNvSpPr>
+          <p:nvPr>
+            <p:ph type="sldNum" sz="quarter" idx="10"/>
+          </p:nvPr>
+        </p:nvSpPr>
+        <p:spPr/>
+        <p:txBody>
+          <a:bodyPr/>
+          <a:lstStyle/>
+          <a:p>
+            <a:fld id="{F9BF1BD6-11A6-594E-AFA1-283323A41F72}" type="slidenum">
+              <a:rPr lang="en-US" smtClean="0"/>
+              <a:pPr/>
+              <a:t>19</a:t>
+            </a:fld>
+            <a:endParaRPr lang="en-US"/>
+          </a:p>
+        </p:txBody>
+      </p:sp>
+    </p:spTree>
+    <p:extLst>
+      <p:ext uri="{BB962C8B-B14F-4D97-AF65-F5344CB8AC3E}">
+        <p14:creationId xmlns:p14="http://schemas.microsoft.com/office/powerpoint/2010/main" val="2630977031"/>
       </p:ext>
     </p:extLst>
   </p:cSld>
@@ -2948,15 +3069,7 @@
             </a:r>
             <a:r>
               <a:rPr lang="en-US" dirty="0" smtClean="0"/>
-              <a:t> Module </a:t>
-            </a:r>
-            <a:r>
-              <a:rPr lang="en-US" dirty="0" smtClean="0"/>
-              <a:t>3:</a:t>
-            </a:r>
-            <a:r>
-              <a:rPr lang="en-US" dirty="0" smtClean="0"/>
-              <a:t/>
+              <a:t> Module 3:</a:t>
             </a:r>
             <a:br>
               <a:rPr lang="en-US" dirty="0" smtClean="0"/>
@@ -3127,6 +3240,1224 @@
 </p:sld>
 </file>
 
+<file path=ppt/slides/slide10.xml><?xml version="1.0" encoding="utf-8"?>
+<p:sld xmlns:a="http://schemas.openxmlformats.org/drawingml/2006/main" xmlns:r="http://schemas.openxmlformats.org/officeDocument/2006/relationships" xmlns:p="http://schemas.openxmlformats.org/presentationml/2006/main">
+  <p:cSld>
+    <p:spTree>
+      <p:nvGrpSpPr>
+        <p:cNvPr id="1" name=""/>
+        <p:cNvGrpSpPr/>
+        <p:nvPr/>
+      </p:nvGrpSpPr>
+      <p:grpSpPr>
+        <a:xfrm>
+          <a:off x="0" y="0"/>
+          <a:ext cx="0" cy="0"/>
+          <a:chOff x="0" y="0"/>
+          <a:chExt cx="0" cy="0"/>
+        </a:xfrm>
+      </p:grpSpPr>
+      <p:sp>
+        <p:nvSpPr>
+          <p:cNvPr id="2" name="Title 1"/>
+          <p:cNvSpPr>
+            <a:spLocks noGrp="1"/>
+          </p:cNvSpPr>
+          <p:nvPr>
+            <p:ph type="title"/>
+          </p:nvPr>
+        </p:nvSpPr>
+        <p:spPr/>
+        <p:txBody>
+          <a:bodyPr/>
+          <a:lstStyle/>
+          <a:p>
+            <a:r>
+              <a:rPr lang="en-US" dirty="0" err="1" smtClean="0"/>
+              <a:t>GenVisR</a:t>
+            </a:r>
+            <a:r>
+              <a:rPr lang="en-US" dirty="0" smtClean="0"/>
+              <a:t>::</a:t>
+            </a:r>
+            <a:r>
+              <a:rPr lang="en-US" dirty="0" err="1" smtClean="0"/>
+              <a:t>cnFreq</a:t>
+            </a:r>
+            <a:r>
+              <a:rPr lang="en-US" dirty="0" smtClean="0"/>
+              <a:t>()</a:t>
+            </a:r>
+            <a:endParaRPr lang="en-US" dirty="0"/>
+          </a:p>
+        </p:txBody>
+      </p:sp>
+      <p:sp>
+        <p:nvSpPr>
+          <p:cNvPr id="3" name="Content Placeholder 2"/>
+          <p:cNvSpPr>
+            <a:spLocks noGrp="1"/>
+          </p:cNvSpPr>
+          <p:nvPr>
+            <p:ph idx="1"/>
+          </p:nvPr>
+        </p:nvSpPr>
+        <p:spPr/>
+        <p:txBody>
+          <a:bodyPr/>
+          <a:lstStyle/>
+          <a:p>
+            <a:r>
+              <a:rPr lang="en-US" dirty="0"/>
+              <a:t>What does it do?</a:t>
+            </a:r>
+          </a:p>
+          <a:p>
+            <a:pPr lvl="1"/>
+            <a:r>
+              <a:rPr lang="en-US" dirty="0"/>
+              <a:t>Another view displayed from </a:t>
+            </a:r>
+            <a:r>
+              <a:rPr lang="en-US" dirty="0" err="1"/>
+              <a:t>cnSpec</a:t>
+            </a:r>
+            <a:endParaRPr lang="en-US" dirty="0"/>
+          </a:p>
+          <a:p>
+            <a:pPr lvl="1"/>
+            <a:r>
+              <a:rPr lang="en-US" dirty="0"/>
+              <a:t>Summarize copy number alterations across a cohort</a:t>
+            </a:r>
+          </a:p>
+          <a:p>
+            <a:pPr lvl="1"/>
+            <a:r>
+              <a:rPr lang="en-US" dirty="0"/>
+              <a:t>Plots segmented copy number alterations for a cohort</a:t>
+            </a:r>
+          </a:p>
+          <a:p>
+            <a:r>
+              <a:rPr lang="en-US" dirty="0"/>
+              <a:t>Why do we care?</a:t>
+            </a:r>
+          </a:p>
+          <a:p>
+            <a:pPr lvl="1"/>
+            <a:r>
+              <a:rPr lang="en-US" dirty="0"/>
+              <a:t>Easily view recurrently amplified/deleted regions</a:t>
+            </a:r>
+          </a:p>
+          <a:p>
+            <a:pPr marL="0" indent="0">
+              <a:buNone/>
+            </a:pPr>
+            <a:endParaRPr lang="en-US" dirty="0"/>
+          </a:p>
+        </p:txBody>
+      </p:sp>
+    </p:spTree>
+    <p:extLst>
+      <p:ext uri="{BB962C8B-B14F-4D97-AF65-F5344CB8AC3E}">
+        <p14:creationId xmlns:p14="http://schemas.microsoft.com/office/powerpoint/2010/main" val="2601097845"/>
+      </p:ext>
+    </p:extLst>
+  </p:cSld>
+  <p:clrMapOvr>
+    <a:masterClrMapping/>
+  </p:clrMapOvr>
+</p:sld>
+</file>
+
+<file path=ppt/slides/slide11.xml><?xml version="1.0" encoding="utf-8"?>
+<p:sld xmlns:a="http://schemas.openxmlformats.org/drawingml/2006/main" xmlns:r="http://schemas.openxmlformats.org/officeDocument/2006/relationships" xmlns:p="http://schemas.openxmlformats.org/presentationml/2006/main">
+  <p:cSld>
+    <p:spTree>
+      <p:nvGrpSpPr>
+        <p:cNvPr id="1" name=""/>
+        <p:cNvGrpSpPr/>
+        <p:nvPr/>
+      </p:nvGrpSpPr>
+      <p:grpSpPr>
+        <a:xfrm>
+          <a:off x="0" y="0"/>
+          <a:ext cx="0" cy="0"/>
+          <a:chOff x="0" y="0"/>
+          <a:chExt cx="0" cy="0"/>
+        </a:xfrm>
+      </p:grpSpPr>
+      <p:sp>
+        <p:nvSpPr>
+          <p:cNvPr id="2" name="Title 1"/>
+          <p:cNvSpPr>
+            <a:spLocks noGrp="1"/>
+          </p:cNvSpPr>
+          <p:nvPr>
+            <p:ph type="title"/>
+          </p:nvPr>
+        </p:nvSpPr>
+        <p:spPr/>
+        <p:txBody>
+          <a:bodyPr/>
+          <a:lstStyle/>
+          <a:p>
+            <a:r>
+              <a:rPr lang="en-US" dirty="0" err="1" smtClean="0"/>
+              <a:t>GenVisR</a:t>
+            </a:r>
+            <a:r>
+              <a:rPr lang="en-US" dirty="0" smtClean="0"/>
+              <a:t>::</a:t>
+            </a:r>
+            <a:r>
+              <a:rPr lang="en-US" dirty="0" err="1" smtClean="0"/>
+              <a:t>cnFreq</a:t>
+            </a:r>
+            <a:r>
+              <a:rPr lang="en-US" dirty="0" smtClean="0"/>
+              <a:t>()</a:t>
+            </a:r>
+            <a:endParaRPr lang="en-US" dirty="0"/>
+          </a:p>
+        </p:txBody>
+      </p:sp>
+      <p:pic>
+        <p:nvPicPr>
+          <p:cNvPr id="6" name="Content Placeholder 5" descr="cnFreq_v1.png"/>
+          <p:cNvPicPr>
+            <a:picLocks noGrp="1" noChangeAspect="1"/>
+          </p:cNvPicPr>
+          <p:nvPr>
+            <p:ph idx="1"/>
+          </p:nvPr>
+        </p:nvPicPr>
+        <p:blipFill>
+          <a:blip r:embed="rId2">
+            <a:extLst>
+              <a:ext uri="{28A0092B-C50C-407E-A947-70E740481C1C}">
+                <a14:useLocalDpi xmlns:a14="http://schemas.microsoft.com/office/drawing/2010/main" val="0"/>
+              </a:ext>
+            </a:extLst>
+          </a:blip>
+          <a:srcRect t="-38943" b="-38943"/>
+          <a:stretch>
+            <a:fillRect/>
+          </a:stretch>
+        </p:blipFill>
+        <p:spPr/>
+      </p:pic>
+      <p:sp>
+        <p:nvSpPr>
+          <p:cNvPr id="8" name="Rectangle 7"/>
+          <p:cNvSpPr/>
+          <p:nvPr/>
+        </p:nvSpPr>
+        <p:spPr>
+          <a:xfrm>
+            <a:off x="0" y="5859723"/>
+            <a:ext cx="8462385" cy="923330"/>
+          </a:xfrm>
+          <a:prstGeom prst="rect">
+            <a:avLst/>
+          </a:prstGeom>
+        </p:spPr>
+        <p:txBody>
+          <a:bodyPr wrap="square">
+            <a:spAutoFit/>
+          </a:bodyPr>
+          <a:lstStyle/>
+          <a:p>
+            <a:r>
+              <a:rPr lang="en-US" dirty="0"/>
+              <a:t>Data from: "Genomic characterization of HER2-positive breast cancer and response to </a:t>
+            </a:r>
+            <a:r>
+              <a:rPr lang="en-US" dirty="0" err="1"/>
+              <a:t>neoadjuvant</a:t>
+            </a:r>
+            <a:r>
+              <a:rPr lang="en-US" dirty="0"/>
+              <a:t> </a:t>
+            </a:r>
+            <a:r>
+              <a:rPr lang="en-US" dirty="0" err="1"/>
+              <a:t>trastuzumab</a:t>
+            </a:r>
+            <a:r>
+              <a:rPr lang="en-US" dirty="0"/>
+              <a:t> and chemotherapy-results from the ACOSOG Z1041 (Alliance) trial."</a:t>
+            </a:r>
+            <a:endParaRPr lang="en-US" dirty="0"/>
+          </a:p>
+        </p:txBody>
+      </p:sp>
+    </p:spTree>
+    <p:extLst>
+      <p:ext uri="{BB962C8B-B14F-4D97-AF65-F5344CB8AC3E}">
+        <p14:creationId xmlns:p14="http://schemas.microsoft.com/office/powerpoint/2010/main" val="1501349731"/>
+      </p:ext>
+    </p:extLst>
+  </p:cSld>
+  <p:clrMapOvr>
+    <a:masterClrMapping/>
+  </p:clrMapOvr>
+</p:sld>
+</file>
+
+<file path=ppt/slides/slide12.xml><?xml version="1.0" encoding="utf-8"?>
+<p:sld xmlns:a="http://schemas.openxmlformats.org/drawingml/2006/main" xmlns:r="http://schemas.openxmlformats.org/officeDocument/2006/relationships" xmlns:p="http://schemas.openxmlformats.org/presentationml/2006/main">
+  <p:cSld>
+    <p:spTree>
+      <p:nvGrpSpPr>
+        <p:cNvPr id="1" name=""/>
+        <p:cNvGrpSpPr/>
+        <p:nvPr/>
+      </p:nvGrpSpPr>
+      <p:grpSpPr>
+        <a:xfrm>
+          <a:off x="0" y="0"/>
+          <a:ext cx="0" cy="0"/>
+          <a:chOff x="0" y="0"/>
+          <a:chExt cx="0" cy="0"/>
+        </a:xfrm>
+      </p:grpSpPr>
+      <p:sp>
+        <p:nvSpPr>
+          <p:cNvPr id="2" name="Title 1"/>
+          <p:cNvSpPr>
+            <a:spLocks noGrp="1"/>
+          </p:cNvSpPr>
+          <p:nvPr>
+            <p:ph type="title"/>
+          </p:nvPr>
+        </p:nvSpPr>
+        <p:spPr/>
+        <p:txBody>
+          <a:bodyPr/>
+          <a:lstStyle/>
+          <a:p>
+            <a:r>
+              <a:rPr lang="en-US" dirty="0" err="1" smtClean="0"/>
+              <a:t>GenVisR</a:t>
+            </a:r>
+            <a:r>
+              <a:rPr lang="en-US" dirty="0" smtClean="0"/>
+              <a:t>::</a:t>
+            </a:r>
+            <a:r>
+              <a:rPr lang="en-US" dirty="0" err="1" smtClean="0"/>
+              <a:t>cnSpec</a:t>
+            </a:r>
+            <a:r>
+              <a:rPr lang="en-US" dirty="0" smtClean="0"/>
+              <a:t>()</a:t>
+            </a:r>
+            <a:endParaRPr lang="en-US" dirty="0"/>
+          </a:p>
+        </p:txBody>
+      </p:sp>
+      <p:sp>
+        <p:nvSpPr>
+          <p:cNvPr id="3" name="Content Placeholder 2"/>
+          <p:cNvSpPr>
+            <a:spLocks noGrp="1"/>
+          </p:cNvSpPr>
+          <p:nvPr>
+            <p:ph idx="1"/>
+          </p:nvPr>
+        </p:nvSpPr>
+        <p:spPr/>
+        <p:txBody>
+          <a:bodyPr/>
+          <a:lstStyle/>
+          <a:p>
+            <a:r>
+              <a:rPr lang="en-US" dirty="0"/>
+              <a:t>What does it do?</a:t>
+            </a:r>
+          </a:p>
+          <a:p>
+            <a:pPr lvl="1"/>
+            <a:r>
+              <a:rPr lang="en-US" dirty="0"/>
+              <a:t>Display recurrent copy number alterations</a:t>
+            </a:r>
+          </a:p>
+          <a:p>
+            <a:r>
+              <a:rPr lang="en-US" dirty="0"/>
+              <a:t>Why do we care?</a:t>
+            </a:r>
+          </a:p>
+          <a:p>
+            <a:pPr lvl="1"/>
+            <a:r>
+              <a:rPr lang="en-US" dirty="0"/>
+              <a:t>Recognize patterns of amplifications and deletions while maintaining a sample information</a:t>
+            </a:r>
+          </a:p>
+          <a:p>
+            <a:endParaRPr lang="en-US" dirty="0"/>
+          </a:p>
+        </p:txBody>
+      </p:sp>
+    </p:spTree>
+    <p:extLst>
+      <p:ext uri="{BB962C8B-B14F-4D97-AF65-F5344CB8AC3E}">
+        <p14:creationId xmlns:p14="http://schemas.microsoft.com/office/powerpoint/2010/main" val="1989961242"/>
+      </p:ext>
+    </p:extLst>
+  </p:cSld>
+  <p:clrMapOvr>
+    <a:masterClrMapping/>
+  </p:clrMapOvr>
+</p:sld>
+</file>
+
+<file path=ppt/slides/slide13.xml><?xml version="1.0" encoding="utf-8"?>
+<p:sld xmlns:a="http://schemas.openxmlformats.org/drawingml/2006/main" xmlns:r="http://schemas.openxmlformats.org/officeDocument/2006/relationships" xmlns:p="http://schemas.openxmlformats.org/presentationml/2006/main">
+  <p:cSld>
+    <p:spTree>
+      <p:nvGrpSpPr>
+        <p:cNvPr id="1" name=""/>
+        <p:cNvGrpSpPr/>
+        <p:nvPr/>
+      </p:nvGrpSpPr>
+      <p:grpSpPr>
+        <a:xfrm>
+          <a:off x="0" y="0"/>
+          <a:ext cx="0" cy="0"/>
+          <a:chOff x="0" y="0"/>
+          <a:chExt cx="0" cy="0"/>
+        </a:xfrm>
+      </p:grpSpPr>
+      <p:sp>
+        <p:nvSpPr>
+          <p:cNvPr id="2" name="Title 1"/>
+          <p:cNvSpPr>
+            <a:spLocks noGrp="1"/>
+          </p:cNvSpPr>
+          <p:nvPr>
+            <p:ph type="title"/>
+          </p:nvPr>
+        </p:nvSpPr>
+        <p:spPr/>
+        <p:txBody>
+          <a:bodyPr/>
+          <a:lstStyle/>
+          <a:p>
+            <a:r>
+              <a:rPr lang="en-US" dirty="0" err="1" smtClean="0"/>
+              <a:t>GenVisR</a:t>
+            </a:r>
+            <a:r>
+              <a:rPr lang="en-US" dirty="0" smtClean="0"/>
+              <a:t>::</a:t>
+            </a:r>
+            <a:r>
+              <a:rPr lang="en-US" dirty="0" err="1" smtClean="0"/>
+              <a:t>cnSpec</a:t>
+            </a:r>
+            <a:r>
+              <a:rPr lang="en-US" dirty="0" smtClean="0"/>
+              <a:t>()</a:t>
+            </a:r>
+            <a:endParaRPr lang="en-US" dirty="0"/>
+          </a:p>
+        </p:txBody>
+      </p:sp>
+      <p:pic>
+        <p:nvPicPr>
+          <p:cNvPr id="10" name="Content Placeholder 9" descr="cnSpec_v1.png"/>
+          <p:cNvPicPr>
+            <a:picLocks noGrp="1" noChangeAspect="1"/>
+          </p:cNvPicPr>
+          <p:nvPr>
+            <p:ph idx="1"/>
+          </p:nvPr>
+        </p:nvPicPr>
+        <p:blipFill>
+          <a:blip r:embed="rId2">
+            <a:extLst>
+              <a:ext uri="{28A0092B-C50C-407E-A947-70E740481C1C}">
+                <a14:useLocalDpi xmlns:a14="http://schemas.microsoft.com/office/drawing/2010/main" val="0"/>
+              </a:ext>
+            </a:extLst>
+          </a:blip>
+          <a:srcRect t="-9295" b="-9295"/>
+          <a:stretch>
+            <a:fillRect/>
+          </a:stretch>
+        </p:blipFill>
+        <p:spPr/>
+      </p:pic>
+      <p:sp>
+        <p:nvSpPr>
+          <p:cNvPr id="11" name="TextBox 10"/>
+          <p:cNvSpPr txBox="1"/>
+          <p:nvPr/>
+        </p:nvSpPr>
+        <p:spPr>
+          <a:xfrm>
+            <a:off x="0" y="5964071"/>
+            <a:ext cx="8766091" cy="923330"/>
+          </a:xfrm>
+          <a:prstGeom prst="rect">
+            <a:avLst/>
+          </a:prstGeom>
+          <a:noFill/>
+        </p:spPr>
+        <p:txBody>
+          <a:bodyPr wrap="square" rtlCol="0">
+            <a:spAutoFit/>
+          </a:bodyPr>
+          <a:lstStyle/>
+          <a:p>
+            <a:r>
+              <a:rPr lang="en-US" dirty="0"/>
+              <a:t>Data from: "Genomic characterization of HER2-positive breast cancer and response to </a:t>
+            </a:r>
+            <a:r>
+              <a:rPr lang="en-US" dirty="0" err="1"/>
+              <a:t>neoadjuvant</a:t>
+            </a:r>
+            <a:r>
+              <a:rPr lang="en-US" dirty="0"/>
+              <a:t> </a:t>
+            </a:r>
+            <a:r>
+              <a:rPr lang="en-US" dirty="0" err="1"/>
+              <a:t>trastuzumab</a:t>
+            </a:r>
+            <a:r>
+              <a:rPr lang="en-US" dirty="0"/>
+              <a:t> and chemotherapy-results from the ACOSOG Z1041 (Alliance) trial."</a:t>
+            </a:r>
+          </a:p>
+        </p:txBody>
+      </p:sp>
+    </p:spTree>
+    <p:extLst>
+      <p:ext uri="{BB962C8B-B14F-4D97-AF65-F5344CB8AC3E}">
+        <p14:creationId xmlns:p14="http://schemas.microsoft.com/office/powerpoint/2010/main" val="1559941324"/>
+      </p:ext>
+    </p:extLst>
+  </p:cSld>
+  <p:clrMapOvr>
+    <a:masterClrMapping/>
+  </p:clrMapOvr>
+</p:sld>
+</file>
+
+<file path=ppt/slides/slide14.xml><?xml version="1.0" encoding="utf-8"?>
+<p:sld xmlns:a="http://schemas.openxmlformats.org/drawingml/2006/main" xmlns:r="http://schemas.openxmlformats.org/officeDocument/2006/relationships" xmlns:p="http://schemas.openxmlformats.org/presentationml/2006/main">
+  <p:cSld>
+    <p:spTree>
+      <p:nvGrpSpPr>
+        <p:cNvPr id="1" name=""/>
+        <p:cNvGrpSpPr/>
+        <p:nvPr/>
+      </p:nvGrpSpPr>
+      <p:grpSpPr>
+        <a:xfrm>
+          <a:off x="0" y="0"/>
+          <a:ext cx="0" cy="0"/>
+          <a:chOff x="0" y="0"/>
+          <a:chExt cx="0" cy="0"/>
+        </a:xfrm>
+      </p:grpSpPr>
+      <p:sp>
+        <p:nvSpPr>
+          <p:cNvPr id="2" name="Title 1"/>
+          <p:cNvSpPr>
+            <a:spLocks noGrp="1"/>
+          </p:cNvSpPr>
+          <p:nvPr>
+            <p:ph type="title"/>
+          </p:nvPr>
+        </p:nvSpPr>
+        <p:spPr/>
+        <p:txBody>
+          <a:bodyPr/>
+          <a:lstStyle/>
+          <a:p>
+            <a:r>
+              <a:rPr lang="en-US" dirty="0" err="1" smtClean="0"/>
+              <a:t>GenVisR</a:t>
+            </a:r>
+            <a:r>
+              <a:rPr lang="en-US" dirty="0" smtClean="0"/>
+              <a:t>::</a:t>
+            </a:r>
+            <a:r>
+              <a:rPr lang="en-US" dirty="0" err="1" smtClean="0"/>
+              <a:t>lohSpec</a:t>
+            </a:r>
+            <a:r>
+              <a:rPr lang="en-US" dirty="0" smtClean="0"/>
+              <a:t>()</a:t>
+            </a:r>
+            <a:endParaRPr lang="en-US" dirty="0"/>
+          </a:p>
+        </p:txBody>
+      </p:sp>
+      <p:sp>
+        <p:nvSpPr>
+          <p:cNvPr id="3" name="Content Placeholder 2"/>
+          <p:cNvSpPr>
+            <a:spLocks noGrp="1"/>
+          </p:cNvSpPr>
+          <p:nvPr>
+            <p:ph idx="1"/>
+          </p:nvPr>
+        </p:nvSpPr>
+        <p:spPr/>
+        <p:txBody>
+          <a:bodyPr/>
+          <a:lstStyle/>
+          <a:p>
+            <a:r>
+              <a:rPr lang="en-US" dirty="0"/>
+              <a:t>What does it do?</a:t>
+            </a:r>
+          </a:p>
+          <a:p>
+            <a:pPr lvl="1"/>
+            <a:r>
+              <a:rPr lang="en-US" dirty="0"/>
+              <a:t>Visualize loss of </a:t>
+            </a:r>
+            <a:r>
+              <a:rPr lang="en-US" dirty="0" err="1"/>
+              <a:t>heterozygosity</a:t>
+            </a:r>
+            <a:r>
+              <a:rPr lang="en-US" dirty="0"/>
+              <a:t> (LOH) for multiple samples</a:t>
+            </a:r>
+          </a:p>
+          <a:p>
+            <a:r>
+              <a:rPr lang="en-US" dirty="0"/>
+              <a:t>Why we care</a:t>
+            </a:r>
+          </a:p>
+          <a:p>
+            <a:pPr lvl="1"/>
+            <a:r>
+              <a:rPr lang="en-US" dirty="0"/>
+              <a:t>Copy-neutral LOH could be missed with a plot produced with functions such as </a:t>
+            </a:r>
+            <a:r>
+              <a:rPr lang="en-US" dirty="0" err="1"/>
+              <a:t>cnSpec</a:t>
+            </a:r>
+            <a:r>
+              <a:rPr lang="en-US" dirty="0"/>
+              <a:t> however these events are potentially interesting</a:t>
+            </a:r>
+          </a:p>
+          <a:p>
+            <a:pPr lvl="1"/>
+            <a:r>
+              <a:rPr lang="en-US" dirty="0" err="1"/>
+              <a:t>lohSpec</a:t>
+            </a:r>
+            <a:r>
+              <a:rPr lang="en-US" dirty="0"/>
+              <a:t> allows these events to be viewed and summarized for multiple samples allowing viewing of recurrent LOH patterns </a:t>
+            </a:r>
+          </a:p>
+          <a:p>
+            <a:endParaRPr lang="en-US" dirty="0"/>
+          </a:p>
+        </p:txBody>
+      </p:sp>
+    </p:spTree>
+    <p:extLst>
+      <p:ext uri="{BB962C8B-B14F-4D97-AF65-F5344CB8AC3E}">
+        <p14:creationId xmlns:p14="http://schemas.microsoft.com/office/powerpoint/2010/main" val="3264973403"/>
+      </p:ext>
+    </p:extLst>
+  </p:cSld>
+  <p:clrMapOvr>
+    <a:masterClrMapping/>
+  </p:clrMapOvr>
+</p:sld>
+</file>
+
+<file path=ppt/slides/slide15.xml><?xml version="1.0" encoding="utf-8"?>
+<p:sld xmlns:a="http://schemas.openxmlformats.org/drawingml/2006/main" xmlns:r="http://schemas.openxmlformats.org/officeDocument/2006/relationships" xmlns:p="http://schemas.openxmlformats.org/presentationml/2006/main">
+  <p:cSld>
+    <p:spTree>
+      <p:nvGrpSpPr>
+        <p:cNvPr id="1" name=""/>
+        <p:cNvGrpSpPr/>
+        <p:nvPr/>
+      </p:nvGrpSpPr>
+      <p:grpSpPr>
+        <a:xfrm>
+          <a:off x="0" y="0"/>
+          <a:ext cx="0" cy="0"/>
+          <a:chOff x="0" y="0"/>
+          <a:chExt cx="0" cy="0"/>
+        </a:xfrm>
+      </p:grpSpPr>
+      <p:sp>
+        <p:nvSpPr>
+          <p:cNvPr id="2" name="Title 1"/>
+          <p:cNvSpPr>
+            <a:spLocks noGrp="1"/>
+          </p:cNvSpPr>
+          <p:nvPr>
+            <p:ph type="title"/>
+          </p:nvPr>
+        </p:nvSpPr>
+        <p:spPr/>
+        <p:txBody>
+          <a:bodyPr/>
+          <a:lstStyle/>
+          <a:p>
+            <a:r>
+              <a:rPr lang="en-US" dirty="0" err="1" smtClean="0"/>
+              <a:t>GenVisR</a:t>
+            </a:r>
+            <a:r>
+              <a:rPr lang="en-US" dirty="0" smtClean="0"/>
+              <a:t>::</a:t>
+            </a:r>
+            <a:r>
+              <a:rPr lang="en-US" dirty="0" err="1" smtClean="0"/>
+              <a:t>lohSpec</a:t>
+            </a:r>
+            <a:r>
+              <a:rPr lang="en-US" dirty="0" smtClean="0"/>
+              <a:t>() for 3 breast cancer cell lines</a:t>
+            </a:r>
+            <a:endParaRPr lang="en-US" dirty="0"/>
+          </a:p>
+        </p:txBody>
+      </p:sp>
+      <p:pic>
+        <p:nvPicPr>
+          <p:cNvPr id="4" name="Content Placeholder 3" descr="lohView.png"/>
+          <p:cNvPicPr>
+            <a:picLocks noGrp="1" noChangeAspect="1"/>
+          </p:cNvPicPr>
+          <p:nvPr>
+            <p:ph idx="1"/>
+          </p:nvPr>
+        </p:nvPicPr>
+        <p:blipFill>
+          <a:blip r:embed="rId2">
+            <a:extLst>
+              <a:ext uri="{28A0092B-C50C-407E-A947-70E740481C1C}">
+                <a14:useLocalDpi xmlns:a14="http://schemas.microsoft.com/office/drawing/2010/main" val="0"/>
+              </a:ext>
+            </a:extLst>
+          </a:blip>
+          <a:srcRect t="-135297" b="-135297"/>
+          <a:stretch>
+            <a:fillRect/>
+          </a:stretch>
+        </p:blipFill>
+        <p:spPr/>
+      </p:pic>
+    </p:spTree>
+    <p:extLst>
+      <p:ext uri="{BB962C8B-B14F-4D97-AF65-F5344CB8AC3E}">
+        <p14:creationId xmlns:p14="http://schemas.microsoft.com/office/powerpoint/2010/main" val="3717913430"/>
+      </p:ext>
+    </p:extLst>
+  </p:cSld>
+  <p:clrMapOvr>
+    <a:masterClrMapping/>
+  </p:clrMapOvr>
+</p:sld>
+</file>
+
+<file path=ppt/slides/slide16.xml><?xml version="1.0" encoding="utf-8"?>
+<p:sld xmlns:a="http://schemas.openxmlformats.org/drawingml/2006/main" xmlns:r="http://schemas.openxmlformats.org/officeDocument/2006/relationships" xmlns:p="http://schemas.openxmlformats.org/presentationml/2006/main">
+  <p:cSld>
+    <p:spTree>
+      <p:nvGrpSpPr>
+        <p:cNvPr id="1" name=""/>
+        <p:cNvGrpSpPr/>
+        <p:nvPr/>
+      </p:nvGrpSpPr>
+      <p:grpSpPr>
+        <a:xfrm>
+          <a:off x="0" y="0"/>
+          <a:ext cx="0" cy="0"/>
+          <a:chOff x="0" y="0"/>
+          <a:chExt cx="0" cy="0"/>
+        </a:xfrm>
+      </p:grpSpPr>
+      <p:sp>
+        <p:nvSpPr>
+          <p:cNvPr id="2" name="Title 1"/>
+          <p:cNvSpPr>
+            <a:spLocks noGrp="1"/>
+          </p:cNvSpPr>
+          <p:nvPr>
+            <p:ph type="title"/>
+          </p:nvPr>
+        </p:nvSpPr>
+        <p:spPr/>
+        <p:txBody>
+          <a:bodyPr/>
+          <a:lstStyle/>
+          <a:p>
+            <a:r>
+              <a:rPr lang="en-US" dirty="0" err="1" smtClean="0"/>
+              <a:t>GenVisR</a:t>
+            </a:r>
+            <a:r>
+              <a:rPr lang="en-US" dirty="0" smtClean="0"/>
+              <a:t>::</a:t>
+            </a:r>
+            <a:r>
+              <a:rPr lang="en-US" dirty="0" err="1" smtClean="0"/>
+              <a:t>genCov</a:t>
+            </a:r>
+            <a:r>
+              <a:rPr lang="en-US" dirty="0" smtClean="0"/>
+              <a:t>()</a:t>
+            </a:r>
+            <a:endParaRPr lang="en-US" dirty="0"/>
+          </a:p>
+        </p:txBody>
+      </p:sp>
+      <p:sp>
+        <p:nvSpPr>
+          <p:cNvPr id="3" name="Content Placeholder 2"/>
+          <p:cNvSpPr>
+            <a:spLocks noGrp="1"/>
+          </p:cNvSpPr>
+          <p:nvPr>
+            <p:ph idx="1"/>
+          </p:nvPr>
+        </p:nvSpPr>
+        <p:spPr/>
+        <p:txBody>
+          <a:bodyPr/>
+          <a:lstStyle/>
+          <a:p>
+            <a:r>
+              <a:rPr lang="en-US" dirty="0"/>
+              <a:t>What does it do?</a:t>
+            </a:r>
+          </a:p>
+          <a:p>
+            <a:pPr lvl="1"/>
+            <a:r>
+              <a:rPr lang="en-US" dirty="0"/>
+              <a:t>Visualize coverage in a region of interest</a:t>
+            </a:r>
+          </a:p>
+          <a:p>
+            <a:r>
+              <a:rPr lang="en-US" dirty="0"/>
+              <a:t>Why do we care?</a:t>
+            </a:r>
+          </a:p>
+          <a:p>
+            <a:pPr lvl="1"/>
+            <a:r>
+              <a:rPr lang="en-US" dirty="0"/>
+              <a:t>Infer the impact of a structural deletion</a:t>
+            </a:r>
+          </a:p>
+          <a:p>
+            <a:pPr lvl="1"/>
+            <a:r>
+              <a:rPr lang="en-US" dirty="0"/>
+              <a:t>Verify gene knockouts</a:t>
+            </a:r>
+          </a:p>
+          <a:p>
+            <a:pPr marL="0" indent="0">
+              <a:buNone/>
+            </a:pPr>
+            <a:endParaRPr lang="en-US" dirty="0"/>
+          </a:p>
+        </p:txBody>
+      </p:sp>
+    </p:spTree>
+    <p:extLst>
+      <p:ext uri="{BB962C8B-B14F-4D97-AF65-F5344CB8AC3E}">
+        <p14:creationId xmlns:p14="http://schemas.microsoft.com/office/powerpoint/2010/main" val="3692564877"/>
+      </p:ext>
+    </p:extLst>
+  </p:cSld>
+  <p:clrMapOvr>
+    <a:masterClrMapping/>
+  </p:clrMapOvr>
+</p:sld>
+</file>
+
+<file path=ppt/slides/slide17.xml><?xml version="1.0" encoding="utf-8"?>
+<p:sld xmlns:a="http://schemas.openxmlformats.org/drawingml/2006/main" xmlns:r="http://schemas.openxmlformats.org/officeDocument/2006/relationships" xmlns:p="http://schemas.openxmlformats.org/presentationml/2006/main">
+  <p:cSld>
+    <p:spTree>
+      <p:nvGrpSpPr>
+        <p:cNvPr id="1" name=""/>
+        <p:cNvGrpSpPr/>
+        <p:nvPr/>
+      </p:nvGrpSpPr>
+      <p:grpSpPr>
+        <a:xfrm>
+          <a:off x="0" y="0"/>
+          <a:ext cx="0" cy="0"/>
+          <a:chOff x="0" y="0"/>
+          <a:chExt cx="0" cy="0"/>
+        </a:xfrm>
+      </p:grpSpPr>
+      <p:sp>
+        <p:nvSpPr>
+          <p:cNvPr id="2" name="Title 1"/>
+          <p:cNvSpPr>
+            <a:spLocks noGrp="1"/>
+          </p:cNvSpPr>
+          <p:nvPr>
+            <p:ph type="title"/>
+          </p:nvPr>
+        </p:nvSpPr>
+        <p:spPr/>
+        <p:txBody>
+          <a:bodyPr/>
+          <a:lstStyle/>
+          <a:p>
+            <a:r>
+              <a:rPr lang="en-US" dirty="0" err="1" smtClean="0"/>
+              <a:t>GenVisR</a:t>
+            </a:r>
+            <a:r>
+              <a:rPr lang="en-US" dirty="0" smtClean="0"/>
+              <a:t>::</a:t>
+            </a:r>
+            <a:r>
+              <a:rPr lang="en-US" dirty="0" err="1" smtClean="0"/>
+              <a:t>genCov</a:t>
+            </a:r>
+            <a:r>
+              <a:rPr lang="en-US" dirty="0" smtClean="0"/>
+              <a:t>()</a:t>
+            </a:r>
+            <a:endParaRPr lang="en-US" dirty="0"/>
+          </a:p>
+        </p:txBody>
+      </p:sp>
+      <p:pic>
+        <p:nvPicPr>
+          <p:cNvPr id="4" name="Content Placeholder 3" descr="IKZF1_all_log2.png"/>
+          <p:cNvPicPr>
+            <a:picLocks noGrp="1" noChangeAspect="1"/>
+          </p:cNvPicPr>
+          <p:nvPr>
+            <p:ph idx="1"/>
+          </p:nvPr>
+        </p:nvPicPr>
+        <p:blipFill>
+          <a:blip r:embed="rId2">
+            <a:extLst>
+              <a:ext uri="{28A0092B-C50C-407E-A947-70E740481C1C}">
+                <a14:useLocalDpi xmlns:a14="http://schemas.microsoft.com/office/drawing/2010/main" val="0"/>
+              </a:ext>
+            </a:extLst>
+          </a:blip>
+          <a:srcRect l="-17459" r="-17459"/>
+          <a:stretch>
+            <a:fillRect/>
+          </a:stretch>
+        </p:blipFill>
+        <p:spPr/>
+      </p:pic>
+      <p:sp>
+        <p:nvSpPr>
+          <p:cNvPr id="5" name="TextBox 4"/>
+          <p:cNvSpPr txBox="1"/>
+          <p:nvPr/>
+        </p:nvSpPr>
+        <p:spPr>
+          <a:xfrm>
+            <a:off x="0" y="6211669"/>
+            <a:ext cx="8545213" cy="646331"/>
+          </a:xfrm>
+          <a:prstGeom prst="rect">
+            <a:avLst/>
+          </a:prstGeom>
+          <a:noFill/>
+        </p:spPr>
+        <p:txBody>
+          <a:bodyPr wrap="square" rtlCol="0">
+            <a:spAutoFit/>
+          </a:bodyPr>
+          <a:lstStyle/>
+          <a:p>
+            <a:r>
+              <a:rPr lang="en-US" dirty="0" smtClean="0"/>
+              <a:t>Fig. 2: </a:t>
+            </a:r>
+            <a:r>
+              <a:rPr lang="en-US" dirty="0"/>
+              <a:t>“Comprehensive genomic analysis reveals FLT3 activation and a therapeutic strategy for a patient with relapsed adult B-lymphoblastic leukemia”</a:t>
+            </a:r>
+          </a:p>
+        </p:txBody>
+      </p:sp>
+    </p:spTree>
+    <p:extLst>
+      <p:ext uri="{BB962C8B-B14F-4D97-AF65-F5344CB8AC3E}">
+        <p14:creationId xmlns:p14="http://schemas.microsoft.com/office/powerpoint/2010/main" val="3978966196"/>
+      </p:ext>
+    </p:extLst>
+  </p:cSld>
+  <p:clrMapOvr>
+    <a:masterClrMapping/>
+  </p:clrMapOvr>
+</p:sld>
+</file>
+
+<file path=ppt/slides/slide18.xml><?xml version="1.0" encoding="utf-8"?>
+<p:sld xmlns:a="http://schemas.openxmlformats.org/drawingml/2006/main" xmlns:r="http://schemas.openxmlformats.org/officeDocument/2006/relationships" xmlns:p="http://schemas.openxmlformats.org/presentationml/2006/main">
+  <p:cSld>
+    <p:spTree>
+      <p:nvGrpSpPr>
+        <p:cNvPr id="1" name=""/>
+        <p:cNvGrpSpPr/>
+        <p:nvPr/>
+      </p:nvGrpSpPr>
+      <p:grpSpPr>
+        <a:xfrm>
+          <a:off x="0" y="0"/>
+          <a:ext cx="0" cy="0"/>
+          <a:chOff x="0" y="0"/>
+          <a:chExt cx="0" cy="0"/>
+        </a:xfrm>
+      </p:grpSpPr>
+      <p:sp>
+        <p:nvSpPr>
+          <p:cNvPr id="2" name="Title 1"/>
+          <p:cNvSpPr>
+            <a:spLocks noGrp="1"/>
+          </p:cNvSpPr>
+          <p:nvPr>
+            <p:ph type="title"/>
+          </p:nvPr>
+        </p:nvSpPr>
+        <p:spPr/>
+        <p:txBody>
+          <a:bodyPr/>
+          <a:lstStyle/>
+          <a:p>
+            <a:r>
+              <a:rPr lang="en-US" dirty="0" err="1" smtClean="0"/>
+              <a:t>GenVisR</a:t>
+            </a:r>
+            <a:r>
+              <a:rPr lang="en-US" dirty="0" smtClean="0"/>
+              <a:t>::</a:t>
+            </a:r>
+            <a:r>
+              <a:rPr lang="en-US" dirty="0" err="1" smtClean="0"/>
+              <a:t>covBars</a:t>
+            </a:r>
+            <a:r>
+              <a:rPr lang="en-US" dirty="0" smtClean="0"/>
+              <a:t>()</a:t>
+            </a:r>
+            <a:endParaRPr lang="en-US" dirty="0"/>
+          </a:p>
+        </p:txBody>
+      </p:sp>
+      <p:sp>
+        <p:nvSpPr>
+          <p:cNvPr id="3" name="Content Placeholder 2"/>
+          <p:cNvSpPr>
+            <a:spLocks noGrp="1"/>
+          </p:cNvSpPr>
+          <p:nvPr>
+            <p:ph idx="1"/>
+          </p:nvPr>
+        </p:nvSpPr>
+        <p:spPr/>
+        <p:txBody>
+          <a:bodyPr/>
+          <a:lstStyle/>
+          <a:p>
+            <a:r>
+              <a:rPr lang="en-US" dirty="0"/>
+              <a:t>What does it do?</a:t>
+            </a:r>
+          </a:p>
+          <a:p>
+            <a:pPr lvl="1"/>
+            <a:r>
+              <a:rPr lang="en-US" dirty="0"/>
+              <a:t>Visualize sequencing coverage achieved across samples</a:t>
+            </a:r>
+          </a:p>
+          <a:p>
+            <a:r>
+              <a:rPr lang="en-US" dirty="0"/>
+              <a:t>Why do we care?</a:t>
+            </a:r>
+          </a:p>
+          <a:p>
+            <a:pPr lvl="1"/>
+            <a:r>
+              <a:rPr lang="en-US" dirty="0"/>
+              <a:t>Immediately identify if a sample has failed sequencing or has not achieved the expected sequencing depth</a:t>
+            </a:r>
+          </a:p>
+          <a:p>
+            <a:pPr marL="0" indent="0">
+              <a:buNone/>
+            </a:pPr>
+            <a:endParaRPr lang="en-US" dirty="0"/>
+          </a:p>
+        </p:txBody>
+      </p:sp>
+    </p:spTree>
+    <p:extLst>
+      <p:ext uri="{BB962C8B-B14F-4D97-AF65-F5344CB8AC3E}">
+        <p14:creationId xmlns:p14="http://schemas.microsoft.com/office/powerpoint/2010/main" val="2377974737"/>
+      </p:ext>
+    </p:extLst>
+  </p:cSld>
+  <p:clrMapOvr>
+    <a:masterClrMapping/>
+  </p:clrMapOvr>
+</p:sld>
+</file>
+
+<file path=ppt/slides/slide19.xml><?xml version="1.0" encoding="utf-8"?>
+<p:sld xmlns:a="http://schemas.openxmlformats.org/drawingml/2006/main" xmlns:r="http://schemas.openxmlformats.org/officeDocument/2006/relationships" xmlns:p="http://schemas.openxmlformats.org/presentationml/2006/main">
+  <p:cSld>
+    <p:spTree>
+      <p:nvGrpSpPr>
+        <p:cNvPr id="1" name=""/>
+        <p:cNvGrpSpPr/>
+        <p:nvPr/>
+      </p:nvGrpSpPr>
+      <p:grpSpPr>
+        <a:xfrm>
+          <a:off x="0" y="0"/>
+          <a:ext cx="0" cy="0"/>
+          <a:chOff x="0" y="0"/>
+          <a:chExt cx="0" cy="0"/>
+        </a:xfrm>
+      </p:grpSpPr>
+      <p:sp>
+        <p:nvSpPr>
+          <p:cNvPr id="2" name="Title 1"/>
+          <p:cNvSpPr>
+            <a:spLocks noGrp="1"/>
+          </p:cNvSpPr>
+          <p:nvPr>
+            <p:ph type="title"/>
+          </p:nvPr>
+        </p:nvSpPr>
+        <p:spPr/>
+        <p:txBody>
+          <a:bodyPr/>
+          <a:lstStyle/>
+          <a:p>
+            <a:r>
+              <a:rPr lang="en-US" dirty="0" err="1" smtClean="0"/>
+              <a:t>GenVisR</a:t>
+            </a:r>
+            <a:r>
+              <a:rPr lang="en-US" dirty="0" smtClean="0"/>
+              <a:t>::</a:t>
+            </a:r>
+            <a:r>
+              <a:rPr lang="en-US" dirty="0" err="1" smtClean="0"/>
+              <a:t>covBars</a:t>
+            </a:r>
+            <a:r>
+              <a:rPr lang="en-US" dirty="0" smtClean="0"/>
+              <a:t>()</a:t>
+            </a:r>
+            <a:endParaRPr lang="en-US" dirty="0"/>
+          </a:p>
+        </p:txBody>
+      </p:sp>
+      <p:pic>
+        <p:nvPicPr>
+          <p:cNvPr id="5" name="Content Placeholder 3" descr="Figure S03 - Coverage Summary.png"/>
+          <p:cNvPicPr>
+            <a:picLocks noGrp="1" noChangeAspect="1"/>
+          </p:cNvPicPr>
+          <p:nvPr>
+            <p:ph idx="1"/>
+          </p:nvPr>
+        </p:nvPicPr>
+        <p:blipFill>
+          <a:blip r:embed="rId3">
+            <a:extLst>
+              <a:ext uri="{28A0092B-C50C-407E-A947-70E740481C1C}">
+                <a14:useLocalDpi xmlns:a14="http://schemas.microsoft.com/office/drawing/2010/main" val="0"/>
+              </a:ext>
+            </a:extLst>
+          </a:blip>
+          <a:srcRect l="-45235" r="-45235"/>
+          <a:stretch>
+            <a:fillRect/>
+          </a:stretch>
+        </p:blipFill>
+        <p:spPr/>
+      </p:pic>
+      <p:sp>
+        <p:nvSpPr>
+          <p:cNvPr id="6" name="TextBox 5"/>
+          <p:cNvSpPr txBox="1"/>
+          <p:nvPr/>
+        </p:nvSpPr>
+        <p:spPr>
+          <a:xfrm>
+            <a:off x="0" y="6211669"/>
+            <a:ext cx="8545213" cy="646331"/>
+          </a:xfrm>
+          <a:prstGeom prst="rect">
+            <a:avLst/>
+          </a:prstGeom>
+          <a:noFill/>
+        </p:spPr>
+        <p:txBody>
+          <a:bodyPr wrap="square" rtlCol="0">
+            <a:spAutoFit/>
+          </a:bodyPr>
+          <a:lstStyle/>
+          <a:p>
+            <a:r>
+              <a:rPr lang="en-US" dirty="0" smtClean="0"/>
+              <a:t>Supp. Fig. </a:t>
+            </a:r>
+            <a:r>
+              <a:rPr lang="en-US" dirty="0"/>
+              <a:t>3: “Comprehensive genomic analysis reveals FLT3 activation and a therapeutic strategy for a patient with relapsed adult B-lymphoblastic leukemia”</a:t>
+            </a:r>
+          </a:p>
+        </p:txBody>
+      </p:sp>
+    </p:spTree>
+    <p:extLst>
+      <p:ext uri="{BB962C8B-B14F-4D97-AF65-F5344CB8AC3E}">
+        <p14:creationId xmlns:p14="http://schemas.microsoft.com/office/powerpoint/2010/main" val="3678410961"/>
+      </p:ext>
+    </p:extLst>
+  </p:cSld>
+  <p:clrMapOvr>
+    <a:masterClrMapping/>
+  </p:clrMapOvr>
+</p:sld>
+</file>
+
 <file path=ppt/slides/slide2.xml><?xml version="1.0" encoding="utf-8"?>
 <p:sld xmlns:a="http://schemas.openxmlformats.org/drawingml/2006/main" xmlns:r="http://schemas.openxmlformats.org/officeDocument/2006/relationships" xmlns:p="http://schemas.openxmlformats.org/presentationml/2006/main">
   <p:cSld>
@@ -3146,85 +4477,145 @@
       </p:grpSpPr>
       <p:sp>
         <p:nvSpPr>
-          <p:cNvPr id="5" name="Rectangle 4"/>
-          <p:cNvSpPr/>
-          <p:nvPr/>
-        </p:nvSpPr>
-        <p:spPr>
-          <a:xfrm>
-            <a:off x="0" y="0"/>
-            <a:ext cx="9143999" cy="168318"/>
-          </a:xfrm>
-          <a:prstGeom prst="rect">
-            <a:avLst/>
-          </a:prstGeom>
-          <a:solidFill>
-            <a:srgbClr val="F9F9F9"/>
-          </a:solidFill>
-          <a:ln>
-            <a:solidFill>
-              <a:srgbClr val="FFFFFF"/>
-            </a:solidFill>
-          </a:ln>
-          <a:effectLst/>
-        </p:spPr>
-        <p:style>
-          <a:lnRef idx="1">
-            <a:schemeClr val="accent1"/>
-          </a:lnRef>
-          <a:fillRef idx="3">
-            <a:schemeClr val="accent1"/>
-          </a:fillRef>
-          <a:effectRef idx="2">
-            <a:schemeClr val="accent1"/>
-          </a:effectRef>
-          <a:fontRef idx="minor">
-            <a:schemeClr val="lt1"/>
-          </a:fontRef>
-        </p:style>
-        <p:txBody>
-          <a:bodyPr rtlCol="0" anchor="ctr"/>
+          <p:cNvPr id="2" name="Title 1"/>
+          <p:cNvSpPr>
+            <a:spLocks noGrp="1"/>
+          </p:cNvSpPr>
+          <p:nvPr>
+            <p:ph type="title"/>
+          </p:nvPr>
+        </p:nvSpPr>
+        <p:spPr/>
+        <p:txBody>
+          <a:bodyPr/>
           <a:lstStyle/>
           <a:p>
-            <a:pPr algn="ctr"/>
-            <a:endParaRPr lang="en-US"/>
-          </a:p>
-        </p:txBody>
-      </p:sp>
-      <p:pic>
-        <p:nvPicPr>
-          <p:cNvPr id="4" name="Picture 3" descr="CC-BY-SA 4.0.png"/>
-          <p:cNvPicPr>
-            <a:picLocks noChangeAspect="1"/>
-          </p:cNvPicPr>
-          <p:nvPr/>
-        </p:nvPicPr>
-        <p:blipFill>
-          <a:blip r:embed="rId3">
-            <a:extLst>
-              <a:ext uri="{28A0092B-C50C-407E-A947-70E740481C1C}">
-                <a14:useLocalDpi xmlns:a14="http://schemas.microsoft.com/office/drawing/2010/main" val="0"/>
-              </a:ext>
-            </a:extLst>
-          </a:blip>
-          <a:stretch>
-            <a:fillRect/>
-          </a:stretch>
-        </p:blipFill>
-        <p:spPr>
-          <a:xfrm>
-            <a:off x="1739900" y="0"/>
-            <a:ext cx="5650156" cy="6858000"/>
-          </a:xfrm>
-          <a:prstGeom prst="rect">
-            <a:avLst/>
-          </a:prstGeom>
-        </p:spPr>
-      </p:pic>
+            <a:r>
+              <a:rPr lang="en-US" dirty="0" smtClean="0"/>
+              <a:t>Learning objectives of the course</a:t>
+            </a:r>
+            <a:endParaRPr lang="en-US" dirty="0"/>
+          </a:p>
+        </p:txBody>
+      </p:sp>
+      <p:sp>
+        <p:nvSpPr>
+          <p:cNvPr id="3" name="Content Placeholder 2"/>
+          <p:cNvSpPr>
+            <a:spLocks noGrp="1"/>
+          </p:cNvSpPr>
+          <p:nvPr>
+            <p:ph idx="1"/>
+          </p:nvPr>
+        </p:nvSpPr>
+        <p:spPr/>
+        <p:txBody>
+          <a:bodyPr>
+            <a:normAutofit fontScale="92500"/>
+          </a:bodyPr>
+          <a:lstStyle/>
+          <a:p>
+            <a:r>
+              <a:rPr lang="en-US" dirty="0" smtClean="0"/>
+              <a:t>Module 1: </a:t>
+            </a:r>
+            <a:r>
+              <a:rPr lang="en-US" dirty="0"/>
+              <a:t>Introduction to genomic data visualization and interpretation</a:t>
+            </a:r>
+            <a:endParaRPr lang="en-US" dirty="0" smtClean="0"/>
+          </a:p>
+          <a:p>
+            <a:r>
+              <a:rPr lang="en-US" dirty="0" smtClean="0"/>
+              <a:t>Module 2</a:t>
+            </a:r>
+            <a:r>
+              <a:rPr lang="en-US" dirty="0"/>
+              <a:t>: Using R for genomic data visualization and </a:t>
+            </a:r>
+            <a:r>
+              <a:rPr lang="en-US" dirty="0" smtClean="0"/>
+              <a:t>interpretation</a:t>
+            </a:r>
+          </a:p>
+          <a:p>
+            <a:r>
+              <a:rPr lang="en-US" b="1" dirty="0" smtClean="0"/>
+              <a:t>Module 3: </a:t>
+            </a:r>
+            <a:r>
+              <a:rPr lang="en-US" b="1" dirty="0"/>
+              <a:t>Introduction to </a:t>
+            </a:r>
+            <a:r>
+              <a:rPr lang="en-US" b="1" dirty="0" err="1" smtClean="0"/>
+              <a:t>GenVisR</a:t>
+            </a:r>
+            <a:endParaRPr lang="en-US" b="1" dirty="0" smtClean="0"/>
+          </a:p>
+          <a:p>
+            <a:r>
+              <a:rPr lang="en-US" dirty="0"/>
+              <a:t>Module 4: Expression profiling, visualization, and interpretation</a:t>
+            </a:r>
+            <a:endParaRPr lang="en-US" dirty="0" smtClean="0"/>
+          </a:p>
+          <a:p>
+            <a:r>
+              <a:rPr lang="en-US" dirty="0" smtClean="0"/>
+              <a:t>Module 5</a:t>
+            </a:r>
+            <a:r>
+              <a:rPr lang="en-US" dirty="0"/>
+              <a:t>: Variant annotation and interpretation</a:t>
+            </a:r>
+            <a:endParaRPr lang="en-US" dirty="0" smtClean="0"/>
+          </a:p>
+          <a:p>
+            <a:r>
+              <a:rPr lang="en-US" dirty="0" smtClean="0"/>
+              <a:t>Module 6</a:t>
+            </a:r>
+            <a:r>
+              <a:rPr lang="en-US" dirty="0"/>
+              <a:t>: Q &amp; A, discussion, integrated assignments, and working with your own </a:t>
+            </a:r>
+            <a:r>
+              <a:rPr lang="en-US" dirty="0" smtClean="0"/>
+              <a:t>data</a:t>
+            </a:r>
+          </a:p>
+          <a:p>
+            <a:endParaRPr lang="en-US" dirty="0"/>
+          </a:p>
+          <a:p>
+            <a:r>
+              <a:rPr lang="en-US" dirty="0" smtClean="0"/>
+              <a:t>Tutorials</a:t>
+            </a:r>
+          </a:p>
+          <a:p>
+            <a:pPr lvl="1"/>
+            <a:r>
+              <a:rPr lang="en-US" dirty="0" smtClean="0"/>
+              <a:t>Provide working examples of data visualization and interpretation</a:t>
+            </a:r>
+          </a:p>
+          <a:p>
+            <a:pPr lvl="1"/>
+            <a:r>
+              <a:rPr lang="en-US" dirty="0" smtClean="0"/>
+              <a:t>Self contained, self explanatory, portable </a:t>
+            </a:r>
+            <a:endParaRPr lang="en-US" dirty="0"/>
+          </a:p>
+        </p:txBody>
+      </p:sp>
     </p:spTree>
     <p:extLst>
       <p:ext uri="{BB962C8B-B14F-4D97-AF65-F5344CB8AC3E}">
-        <p14:creationId xmlns:p14="http://schemas.microsoft.com/office/powerpoint/2010/main" val="1048356560"/>
+        <p14:creationId xmlns:p14="http://schemas.microsoft.com/office/powerpoint/2010/main" val="135940326"/>
       </p:ext>
     </p:extLst>
   </p:cSld>
@@ -3275,7 +4666,7 @@
           <a:p>
             <a:r>
               <a:rPr lang="en-US" dirty="0" smtClean="0"/>
-              <a:t>Learning objectives of the course</a:t>
+              <a:t>Learning objectives of module 3</a:t>
             </a:r>
             <a:endParaRPr lang="en-US" dirty="0"/>
           </a:p>
@@ -3293,116 +4684,152 @@
         </p:nvSpPr>
         <p:spPr/>
         <p:txBody>
-          <a:bodyPr>
-            <a:normAutofit fontScale="92500"/>
-          </a:bodyPr>
+          <a:bodyPr/>
           <a:lstStyle/>
           <a:p>
             <a:r>
-              <a:rPr lang="en-US" dirty="0" smtClean="0"/>
-              <a:t>Module 1: </a:t>
-            </a:r>
-            <a:r>
-              <a:rPr lang="en-US" dirty="0"/>
-              <a:t>Introduction to genomic data visualization and interpretation</a:t>
+              <a:rPr lang="en-US" dirty="0"/>
+              <a:t>Introduction to </a:t>
+            </a:r>
+            <a:r>
+              <a:rPr lang="en-US" dirty="0" err="1" smtClean="0"/>
+              <a:t>GenVisR</a:t>
+            </a:r>
+            <a:endParaRPr lang="en-US" dirty="0"/>
+          </a:p>
+          <a:p>
+            <a:pPr lvl="1"/>
+            <a:r>
+              <a:rPr lang="en-US" dirty="0" smtClean="0"/>
+              <a:t>Creation and interpretation of </a:t>
+            </a:r>
+            <a:r>
+              <a:rPr lang="en-US" dirty="0" err="1" smtClean="0"/>
+              <a:t>GenVisR</a:t>
+            </a:r>
+            <a:r>
+              <a:rPr lang="en-US" dirty="0" smtClean="0"/>
+              <a:t> plots</a:t>
+            </a:r>
+          </a:p>
+          <a:p>
+            <a:pPr lvl="2"/>
+            <a:r>
+              <a:rPr lang="en-US" dirty="0"/>
+              <a:t>w</a:t>
+            </a:r>
+            <a:r>
+              <a:rPr lang="en-US" dirty="0" smtClean="0"/>
+              <a:t>aterfall()</a:t>
+            </a:r>
+          </a:p>
+          <a:p>
+            <a:pPr lvl="2"/>
+            <a:r>
+              <a:rPr lang="en-US" dirty="0" err="1" smtClean="0"/>
+              <a:t>TvTi</a:t>
+            </a:r>
+            <a:r>
+              <a:rPr lang="en-US" dirty="0" smtClean="0"/>
+              <a:t>()</a:t>
+            </a:r>
+          </a:p>
+          <a:p>
+            <a:pPr lvl="2"/>
+            <a:r>
+              <a:rPr lang="en-US" dirty="0" err="1" smtClean="0"/>
+              <a:t>genCov</a:t>
+            </a:r>
+            <a:r>
+              <a:rPr lang="en-US" dirty="0" smtClean="0"/>
+              <a:t>()</a:t>
+            </a:r>
+          </a:p>
+          <a:p>
+            <a:pPr lvl="2"/>
+            <a:r>
+              <a:rPr lang="en-US" dirty="0" err="1" smtClean="0"/>
+              <a:t>cnFreq</a:t>
+            </a:r>
+            <a:r>
+              <a:rPr lang="en-US" dirty="0" smtClean="0"/>
+              <a:t>()</a:t>
+            </a:r>
+          </a:p>
+          <a:p>
+            <a:pPr lvl="2"/>
+            <a:r>
+              <a:rPr lang="en-US" dirty="0" err="1" smtClean="0"/>
+              <a:t>cnSpec</a:t>
+            </a:r>
+            <a:r>
+              <a:rPr lang="en-US" dirty="0" smtClean="0"/>
+              <a:t>()</a:t>
+            </a:r>
+          </a:p>
+          <a:p>
+            <a:pPr lvl="2"/>
+            <a:r>
+              <a:rPr lang="en-US" dirty="0" err="1" smtClean="0"/>
+              <a:t>lohSpec</a:t>
+            </a:r>
+            <a:r>
+              <a:rPr lang="en-US" dirty="0" smtClean="0"/>
+              <a:t>()</a:t>
+            </a:r>
+          </a:p>
+          <a:p>
+            <a:pPr lvl="2"/>
+            <a:r>
+              <a:rPr lang="en-US" dirty="0" err="1" smtClean="0"/>
+              <a:t>covBars</a:t>
+            </a:r>
+            <a:r>
+              <a:rPr lang="en-US" dirty="0" smtClean="0"/>
+              <a:t>()</a:t>
+            </a:r>
+          </a:p>
+          <a:p>
+            <a:pPr lvl="1"/>
+            <a:r>
+              <a:rPr lang="en-US" dirty="0" smtClean="0"/>
+              <a:t>Adding plot layers to </a:t>
+            </a:r>
+            <a:r>
+              <a:rPr lang="en-US" dirty="0" err="1" smtClean="0"/>
+              <a:t>GenVisR</a:t>
+            </a:r>
+            <a:r>
+              <a:rPr lang="en-US" dirty="0" smtClean="0"/>
+              <a:t> </a:t>
+            </a:r>
+          </a:p>
+          <a:p>
+            <a:pPr lvl="1"/>
+            <a:r>
+              <a:rPr lang="en-US" dirty="0" smtClean="0"/>
+              <a:t>Arranging viewports with </a:t>
+            </a:r>
+            <a:r>
+              <a:rPr lang="en-US" dirty="0" err="1" smtClean="0"/>
+              <a:t>gridExtra</a:t>
             </a:r>
             <a:endParaRPr lang="en-US" dirty="0" smtClean="0"/>
           </a:p>
           <a:p>
-            <a:r>
-              <a:rPr lang="en-US" dirty="0" smtClean="0"/>
-              <a:t>Module 2</a:t>
-            </a:r>
-            <a:r>
-              <a:rPr lang="en-US" dirty="0"/>
-              <a:t>: Using R for genomic data visualization and </a:t>
-            </a:r>
-            <a:r>
-              <a:rPr lang="en-US" dirty="0" smtClean="0"/>
-              <a:t>interpretation</a:t>
-            </a:r>
-          </a:p>
-          <a:p>
-            <a:r>
-              <a:rPr lang="en-US" b="1" dirty="0" smtClean="0"/>
-              <a:t>Module </a:t>
-            </a:r>
-            <a:r>
-              <a:rPr lang="en-US" b="1" dirty="0" smtClean="0"/>
-              <a:t>3: </a:t>
-            </a:r>
-            <a:r>
-              <a:rPr lang="en-US" b="1" dirty="0"/>
-              <a:t>Introduction to </a:t>
-            </a:r>
-            <a:r>
-              <a:rPr lang="en-US" b="1" dirty="0" err="1" smtClean="0"/>
-              <a:t>GenVisR</a:t>
-            </a:r>
-            <a:endParaRPr lang="en-US" b="1" dirty="0" smtClean="0"/>
-          </a:p>
-          <a:p>
-            <a:r>
-              <a:rPr lang="en-US" dirty="0"/>
-              <a:t>Module 4: Expression profiling, visualization, and interpretation</a:t>
+            <a:pPr lvl="1"/>
+            <a:r>
+              <a:rPr lang="en-US" dirty="0" smtClean="0"/>
+              <a:t>Aligning viewports with </a:t>
+            </a:r>
+            <a:r>
+              <a:rPr lang="en-US" dirty="0" err="1" smtClean="0"/>
+              <a:t>gtable</a:t>
             </a:r>
             <a:endParaRPr lang="en-US" dirty="0" smtClean="0"/>
           </a:p>
           <a:p>
-            <a:r>
-              <a:rPr lang="en-US" dirty="0" smtClean="0"/>
-              <a:t>Module </a:t>
-            </a:r>
-            <a:r>
-              <a:rPr lang="en-US" dirty="0" smtClean="0"/>
-              <a:t>5</a:t>
-            </a:r>
-            <a:r>
-              <a:rPr lang="en-US" dirty="0"/>
-              <a:t>: Variant annotation and interpretation</a:t>
-            </a:r>
-            <a:endParaRPr lang="en-US" dirty="0" smtClean="0"/>
-          </a:p>
-          <a:p>
-            <a:r>
-              <a:rPr lang="en-US" dirty="0" smtClean="0"/>
-              <a:t>Module </a:t>
-            </a:r>
-            <a:r>
-              <a:rPr lang="en-US" dirty="0" smtClean="0"/>
-              <a:t>6</a:t>
-            </a:r>
-            <a:r>
-              <a:rPr lang="en-US" dirty="0"/>
-              <a:t>: Q &amp; A, discussion, integrated assignments, and working with your own </a:t>
-            </a:r>
-            <a:r>
-              <a:rPr lang="en-US" dirty="0" smtClean="0"/>
-              <a:t>data</a:t>
-            </a:r>
-          </a:p>
-          <a:p>
-            <a:endParaRPr lang="en-US" dirty="0"/>
-          </a:p>
-          <a:p>
-            <a:r>
-              <a:rPr lang="en-US" dirty="0" smtClean="0"/>
-              <a:t>Tutorials</a:t>
-            </a:r>
-          </a:p>
-          <a:p>
-            <a:pPr lvl="1"/>
-            <a:r>
-              <a:rPr lang="en-US" dirty="0" smtClean="0"/>
-              <a:t>Provide working examples of data visualization and interpretation</a:t>
-            </a:r>
-          </a:p>
-          <a:p>
-            <a:pPr lvl="1"/>
-            <a:r>
-              <a:rPr lang="en-US" dirty="0" smtClean="0"/>
-              <a:t>Self contained, self explanatory, portable </a:t>
-            </a:r>
+            <a:pPr lvl="2"/>
             <a:endParaRPr lang="en-US" dirty="0"/>
           </a:p>
         </p:txBody>
@@ -3410,7 +4837,7 @@
     </p:spTree>
     <p:extLst>
       <p:ext uri="{BB962C8B-B14F-4D97-AF65-F5344CB8AC3E}">
-        <p14:creationId xmlns:p14="http://schemas.microsoft.com/office/powerpoint/2010/main" val="135940326"/>
+        <p14:creationId xmlns:p14="http://schemas.microsoft.com/office/powerpoint/2010/main" val="426510709"/>
       </p:ext>
     </p:extLst>
   </p:cSld>
@@ -3460,14 +4887,17 @@
           <a:lstStyle/>
           <a:p>
             <a:r>
-              <a:rPr lang="en-US" dirty="0" smtClean="0"/>
-              <a:t>Learning objectives of module </a:t>
-            </a:r>
-            <a:r>
-              <a:rPr lang="en-US" dirty="0" smtClean="0"/>
-              <a:t>3</a:t>
-            </a:r>
-            <a:endParaRPr lang="en-US" dirty="0"/>
+              <a:rPr lang="en-US" dirty="0"/>
+              <a:t>What is </a:t>
+            </a:r>
+            <a:r>
+              <a:rPr lang="en-US" dirty="0" err="1"/>
+              <a:t>GenVisR</a:t>
+            </a:r>
+            <a:r>
+              <a:rPr lang="en-US" dirty="0"/>
+              <a:t>?</a:t>
+            </a:r>
           </a:p>
         </p:txBody>
       </p:sp>
@@ -3488,20 +4918,70 @@
           <a:p>
             <a:r>
               <a:rPr lang="en-US" dirty="0"/>
-              <a:t>Introduction to </a:t>
+              <a:t>Provides a toolkit for visualizing Genomic data</a:t>
+            </a:r>
+          </a:p>
+          <a:p>
+            <a:r>
+              <a:rPr lang="en-US" dirty="0"/>
+              <a:t>Implemented in R</a:t>
+            </a:r>
+          </a:p>
+          <a:p>
+            <a:r>
+              <a:rPr lang="en-US" dirty="0"/>
+              <a:t>Emphasis on producing “publication quality” graphics with a minimal amount of user input.</a:t>
+            </a:r>
+          </a:p>
+          <a:p>
+            <a:r>
+              <a:rPr lang="en-US" dirty="0"/>
+              <a:t>Part of </a:t>
             </a:r>
             <a:r>
               <a:rPr lang="en-US" dirty="0" err="1"/>
-              <a:t>GenVisR</a:t>
-            </a:r>
-            <a:endParaRPr lang="en-US"/>
+              <a:t>bioconductor</a:t>
+            </a:r>
+            <a:endParaRPr lang="en-US" dirty="0"/>
           </a:p>
           <a:p>
             <a:pPr lvl="1"/>
             <a:r>
-              <a:rPr lang="mr-IN" smtClean="0"/>
-              <a:t>…</a:t>
-            </a:r>
+              <a:rPr lang="en-US" dirty="0">
+                <a:hlinkClick r:id="rId2"/>
+              </a:rPr>
+              <a:t>https://www.bioconductor.org/packages/3.3/bioc/html/GenVisR.html</a:t>
+            </a:r>
+            <a:endParaRPr lang="en-US" dirty="0"/>
+          </a:p>
+          <a:p>
+            <a:r>
+              <a:rPr lang="en-US" dirty="0"/>
+              <a:t>Active development on </a:t>
+            </a:r>
+            <a:r>
+              <a:rPr lang="en-US" dirty="0" err="1"/>
+              <a:t>github</a:t>
+            </a:r>
+            <a:endParaRPr lang="en-US" dirty="0"/>
+          </a:p>
+          <a:p>
+            <a:pPr lvl="1"/>
+            <a:r>
+              <a:rPr lang="en-US" dirty="0">
+                <a:hlinkClick r:id="rId3"/>
+              </a:rPr>
+              <a:t>https://github.com/griffithlab/GenVisR</a:t>
+            </a:r>
+            <a:endParaRPr lang="en-US" dirty="0"/>
+          </a:p>
+          <a:p>
+            <a:r>
+              <a:rPr lang="en-US" dirty="0"/>
+              <a:t>Functions focused in three areas “Small variants”, “Copy number alterations”, and “Data quality”</a:t>
+            </a:r>
+          </a:p>
+          <a:p>
             <a:endParaRPr lang="en-US" dirty="0"/>
           </a:p>
         </p:txBody>
@@ -3509,20 +4989,741 @@
     </p:spTree>
     <p:extLst>
       <p:ext uri="{BB962C8B-B14F-4D97-AF65-F5344CB8AC3E}">
-        <p14:creationId xmlns:p14="http://schemas.microsoft.com/office/powerpoint/2010/main" val="426510709"/>
+        <p14:creationId xmlns:p14="http://schemas.microsoft.com/office/powerpoint/2010/main" val="1023695290"/>
       </p:ext>
     </p:extLst>
   </p:cSld>
   <p:clrMapOvr>
     <a:masterClrMapping/>
   </p:clrMapOvr>
-  <p:timing>
-    <p:tnLst>
-      <p:par>
-        <p:cTn xmlns:p14="http://schemas.microsoft.com/office/powerpoint/2010/main" id="1" dur="indefinite" restart="never" nodeType="tmRoot"/>
-      </p:par>
-    </p:tnLst>
-  </p:timing>
+</p:sld>
+</file>
+
+<file path=ppt/slides/slide5.xml><?xml version="1.0" encoding="utf-8"?>
+<p:sld xmlns:a="http://schemas.openxmlformats.org/drawingml/2006/main" xmlns:r="http://schemas.openxmlformats.org/officeDocument/2006/relationships" xmlns:p="http://schemas.openxmlformats.org/presentationml/2006/main">
+  <p:cSld>
+    <p:spTree>
+      <p:nvGrpSpPr>
+        <p:cNvPr id="1" name=""/>
+        <p:cNvGrpSpPr/>
+        <p:nvPr/>
+      </p:nvGrpSpPr>
+      <p:grpSpPr>
+        <a:xfrm>
+          <a:off x="0" y="0"/>
+          <a:ext cx="0" cy="0"/>
+          <a:chOff x="0" y="0"/>
+          <a:chExt cx="0" cy="0"/>
+        </a:xfrm>
+      </p:grpSpPr>
+      <p:sp>
+        <p:nvSpPr>
+          <p:cNvPr id="2" name="Title 1"/>
+          <p:cNvSpPr>
+            <a:spLocks noGrp="1"/>
+          </p:cNvSpPr>
+          <p:nvPr>
+            <p:ph type="title"/>
+          </p:nvPr>
+        </p:nvSpPr>
+        <p:spPr/>
+        <p:txBody>
+          <a:bodyPr/>
+          <a:lstStyle/>
+          <a:p>
+            <a:r>
+              <a:rPr lang="en-US" dirty="0" smtClean="0"/>
+              <a:t>Why </a:t>
+            </a:r>
+            <a:r>
+              <a:rPr lang="en-US" dirty="0" err="1" smtClean="0"/>
+              <a:t>GenVisR</a:t>
+            </a:r>
+            <a:r>
+              <a:rPr lang="en-US" dirty="0" smtClean="0"/>
+              <a:t>?</a:t>
+            </a:r>
+            <a:endParaRPr lang="en-US" dirty="0"/>
+          </a:p>
+        </p:txBody>
+      </p:sp>
+      <p:sp>
+        <p:nvSpPr>
+          <p:cNvPr id="3" name="Content Placeholder 2"/>
+          <p:cNvSpPr>
+            <a:spLocks noGrp="1"/>
+          </p:cNvSpPr>
+          <p:nvPr>
+            <p:ph idx="1"/>
+          </p:nvPr>
+        </p:nvSpPr>
+        <p:spPr/>
+        <p:txBody>
+          <a:bodyPr/>
+          <a:lstStyle/>
+          <a:p>
+            <a:r>
+              <a:rPr lang="en-US" dirty="0" smtClean="0"/>
+              <a:t> </a:t>
+            </a:r>
+            <a:r>
+              <a:rPr lang="en-US" dirty="0"/>
+              <a:t>The package is built upon </a:t>
+            </a:r>
+            <a:r>
+              <a:rPr lang="en-US" dirty="0" smtClean="0"/>
+              <a:t>ggplot2 and </a:t>
+            </a:r>
+            <a:r>
+              <a:rPr lang="en-US" dirty="0"/>
+              <a:t>will allow us to leverage information we've learned in previous modules</a:t>
+            </a:r>
+            <a:r>
+              <a:rPr lang="en-US" dirty="0" smtClean="0"/>
+              <a:t>.</a:t>
+            </a:r>
+          </a:p>
+          <a:p>
+            <a:r>
+              <a:rPr lang="en-US" dirty="0" smtClean="0"/>
+              <a:t>The </a:t>
+            </a:r>
+            <a:r>
+              <a:rPr lang="en-US" dirty="0"/>
+              <a:t>package is intended to be flexible supporting multiple file types, species, etc.</a:t>
+            </a:r>
+          </a:p>
+          <a:p>
+            <a:r>
+              <a:rPr lang="en-US" dirty="0" smtClean="0"/>
+              <a:t>The </a:t>
+            </a:r>
+            <a:r>
+              <a:rPr lang="en-US" dirty="0"/>
+              <a:t>package is relatively popular; </a:t>
+            </a:r>
+            <a:r>
+              <a:rPr lang="en-US" dirty="0" smtClean="0"/>
+              <a:t>In </a:t>
+            </a:r>
+            <a:r>
+              <a:rPr lang="en-US" dirty="0"/>
+              <a:t>the top 20% of </a:t>
+            </a:r>
+            <a:r>
+              <a:rPr lang="en-US" dirty="0" err="1" smtClean="0"/>
+              <a:t>bioconductor</a:t>
+            </a:r>
+            <a:r>
+              <a:rPr lang="en-US" dirty="0" smtClean="0"/>
+              <a:t> </a:t>
+            </a:r>
+            <a:r>
+              <a:rPr lang="en-US" dirty="0"/>
+              <a:t>downloads.</a:t>
+            </a:r>
+          </a:p>
+          <a:p>
+            <a:r>
+              <a:rPr lang="en-US" dirty="0" smtClean="0"/>
+              <a:t>The </a:t>
+            </a:r>
+            <a:r>
+              <a:rPr lang="en-US" dirty="0"/>
+              <a:t>package is regularly updated with improvements, bug fixes, etc.</a:t>
+            </a:r>
+          </a:p>
+          <a:p>
+            <a:r>
+              <a:rPr lang="en-US" dirty="0" smtClean="0"/>
+              <a:t>The </a:t>
+            </a:r>
+            <a:r>
+              <a:rPr lang="en-US" dirty="0"/>
+              <a:t>package is maintained by the </a:t>
+            </a:r>
+            <a:r>
+              <a:rPr lang="en-US" dirty="0" err="1"/>
+              <a:t>griffithlab</a:t>
+            </a:r>
+            <a:endParaRPr lang="en-US" dirty="0"/>
+          </a:p>
+        </p:txBody>
+      </p:sp>
+    </p:spTree>
+    <p:extLst>
+      <p:ext uri="{BB962C8B-B14F-4D97-AF65-F5344CB8AC3E}">
+        <p14:creationId xmlns:p14="http://schemas.microsoft.com/office/powerpoint/2010/main" val="4184394177"/>
+      </p:ext>
+    </p:extLst>
+  </p:cSld>
+  <p:clrMapOvr>
+    <a:masterClrMapping/>
+  </p:clrMapOvr>
+</p:sld>
+</file>
+
+<file path=ppt/slides/slide6.xml><?xml version="1.0" encoding="utf-8"?>
+<p:sld xmlns:a="http://schemas.openxmlformats.org/drawingml/2006/main" xmlns:r="http://schemas.openxmlformats.org/officeDocument/2006/relationships" xmlns:p="http://schemas.openxmlformats.org/presentationml/2006/main">
+  <p:cSld>
+    <p:spTree>
+      <p:nvGrpSpPr>
+        <p:cNvPr id="1" name=""/>
+        <p:cNvGrpSpPr/>
+        <p:nvPr/>
+      </p:nvGrpSpPr>
+      <p:grpSpPr>
+        <a:xfrm>
+          <a:off x="0" y="0"/>
+          <a:ext cx="0" cy="0"/>
+          <a:chOff x="0" y="0"/>
+          <a:chExt cx="0" cy="0"/>
+        </a:xfrm>
+      </p:grpSpPr>
+      <p:sp>
+        <p:nvSpPr>
+          <p:cNvPr id="2" name="Title 1"/>
+          <p:cNvSpPr>
+            <a:spLocks noGrp="1"/>
+          </p:cNvSpPr>
+          <p:nvPr>
+            <p:ph type="title"/>
+          </p:nvPr>
+        </p:nvSpPr>
+        <p:spPr/>
+        <p:txBody>
+          <a:bodyPr/>
+          <a:lstStyle/>
+          <a:p>
+            <a:r>
+              <a:rPr lang="en-US" dirty="0" err="1" smtClean="0"/>
+              <a:t>GenVisR</a:t>
+            </a:r>
+            <a:r>
+              <a:rPr lang="en-US" dirty="0" smtClean="0"/>
+              <a:t>::waterfall()</a:t>
+            </a:r>
+            <a:endParaRPr lang="en-US" dirty="0"/>
+          </a:p>
+        </p:txBody>
+      </p:sp>
+      <p:sp>
+        <p:nvSpPr>
+          <p:cNvPr id="3" name="Content Placeholder 2"/>
+          <p:cNvSpPr>
+            <a:spLocks noGrp="1"/>
+          </p:cNvSpPr>
+          <p:nvPr>
+            <p:ph idx="1"/>
+          </p:nvPr>
+        </p:nvSpPr>
+        <p:spPr/>
+        <p:txBody>
+          <a:bodyPr/>
+          <a:lstStyle/>
+          <a:p>
+            <a:r>
+              <a:rPr lang="en-US" dirty="0"/>
+              <a:t>What does it do?</a:t>
+            </a:r>
+          </a:p>
+          <a:p>
+            <a:pPr lvl="1"/>
+            <a:r>
+              <a:rPr lang="en-US" dirty="0"/>
+              <a:t>Visualize the types of mutations within a cohort</a:t>
+            </a:r>
+          </a:p>
+          <a:p>
+            <a:pPr lvl="1"/>
+            <a:r>
+              <a:rPr lang="en-US" dirty="0"/>
+              <a:t>Visualize the mutation burden in a data set</a:t>
+            </a:r>
+          </a:p>
+          <a:p>
+            <a:pPr lvl="1"/>
+            <a:r>
+              <a:rPr lang="en-US" dirty="0"/>
+              <a:t>Visualize the proportion of samples with a mutated gene</a:t>
+            </a:r>
+          </a:p>
+          <a:p>
+            <a:pPr lvl="1"/>
+            <a:r>
+              <a:rPr lang="en-US" dirty="0"/>
+              <a:t>Visualize clinical data</a:t>
+            </a:r>
+          </a:p>
+          <a:p>
+            <a:r>
+              <a:rPr lang="en-US" dirty="0"/>
+              <a:t>Why do we care?</a:t>
+            </a:r>
+          </a:p>
+          <a:p>
+            <a:pPr lvl="1"/>
+            <a:r>
+              <a:rPr lang="en-US" dirty="0"/>
+              <a:t>Determine mutually exclusive or co-occurring genomic events</a:t>
+            </a:r>
+          </a:p>
+          <a:p>
+            <a:pPr lvl="1"/>
+            <a:r>
+              <a:rPr lang="en-US" dirty="0"/>
+              <a:t>Recognize patterns within clinical data</a:t>
+            </a:r>
+          </a:p>
+          <a:p>
+            <a:pPr lvl="1"/>
+            <a:r>
+              <a:rPr lang="en-US" dirty="0"/>
+              <a:t>See if the mutation burden conforms to expectations</a:t>
+            </a:r>
+          </a:p>
+          <a:p>
+            <a:endParaRPr lang="en-US" dirty="0"/>
+          </a:p>
+        </p:txBody>
+      </p:sp>
+    </p:spTree>
+    <p:extLst>
+      <p:ext uri="{BB962C8B-B14F-4D97-AF65-F5344CB8AC3E}">
+        <p14:creationId xmlns:p14="http://schemas.microsoft.com/office/powerpoint/2010/main" val="2649635689"/>
+      </p:ext>
+    </p:extLst>
+  </p:cSld>
+  <p:clrMapOvr>
+    <a:masterClrMapping/>
+  </p:clrMapOvr>
+</p:sld>
+</file>
+
+<file path=ppt/slides/slide7.xml><?xml version="1.0" encoding="utf-8"?>
+<p:sld xmlns:a="http://schemas.openxmlformats.org/drawingml/2006/main" xmlns:r="http://schemas.openxmlformats.org/officeDocument/2006/relationships" xmlns:p="http://schemas.openxmlformats.org/presentationml/2006/main">
+  <p:cSld>
+    <p:spTree>
+      <p:nvGrpSpPr>
+        <p:cNvPr id="1" name=""/>
+        <p:cNvGrpSpPr/>
+        <p:nvPr/>
+      </p:nvGrpSpPr>
+      <p:grpSpPr>
+        <a:xfrm>
+          <a:off x="0" y="0"/>
+          <a:ext cx="0" cy="0"/>
+          <a:chOff x="0" y="0"/>
+          <a:chExt cx="0" cy="0"/>
+        </a:xfrm>
+      </p:grpSpPr>
+      <p:sp>
+        <p:nvSpPr>
+          <p:cNvPr id="2" name="Title 1"/>
+          <p:cNvSpPr>
+            <a:spLocks noGrp="1"/>
+          </p:cNvSpPr>
+          <p:nvPr>
+            <p:ph type="title"/>
+          </p:nvPr>
+        </p:nvSpPr>
+        <p:spPr/>
+        <p:txBody>
+          <a:bodyPr/>
+          <a:lstStyle/>
+          <a:p>
+            <a:r>
+              <a:rPr lang="en-US" dirty="0" err="1" smtClean="0"/>
+              <a:t>GenVisR</a:t>
+            </a:r>
+            <a:r>
+              <a:rPr lang="en-US" dirty="0" smtClean="0"/>
+              <a:t>::waterfall()</a:t>
+            </a:r>
+            <a:endParaRPr lang="en-US" dirty="0"/>
+          </a:p>
+        </p:txBody>
+      </p:sp>
+      <p:pic>
+        <p:nvPicPr>
+          <p:cNvPr id="6" name="Content Placeholder 5" descr="tmp.png"/>
+          <p:cNvPicPr>
+            <a:picLocks noGrp="1" noChangeAspect="1"/>
+          </p:cNvPicPr>
+          <p:nvPr>
+            <p:ph idx="1"/>
+          </p:nvPr>
+        </p:nvPicPr>
+        <p:blipFill>
+          <a:blip r:embed="rId3">
+            <a:extLst>
+              <a:ext uri="{28A0092B-C50C-407E-A947-70E740481C1C}">
+                <a14:useLocalDpi xmlns:a14="http://schemas.microsoft.com/office/drawing/2010/main" val="0"/>
+              </a:ext>
+            </a:extLst>
+          </a:blip>
+          <a:srcRect l="-29612" r="-29612"/>
+          <a:stretch>
+            <a:fillRect/>
+          </a:stretch>
+        </p:blipFill>
+        <p:spPr/>
+      </p:pic>
+      <p:sp>
+        <p:nvSpPr>
+          <p:cNvPr id="7" name="TextBox 6"/>
+          <p:cNvSpPr txBox="1"/>
+          <p:nvPr/>
+        </p:nvSpPr>
+        <p:spPr>
+          <a:xfrm>
+            <a:off x="226785" y="6240193"/>
+            <a:ext cx="8235600" cy="369332"/>
+          </a:xfrm>
+          <a:prstGeom prst="rect">
+            <a:avLst/>
+          </a:prstGeom>
+          <a:noFill/>
+        </p:spPr>
+        <p:txBody>
+          <a:bodyPr wrap="square" rtlCol="0">
+            <a:spAutoFit/>
+          </a:bodyPr>
+          <a:lstStyle/>
+          <a:p>
+            <a:r>
+              <a:rPr lang="en-US" dirty="0" smtClean="0"/>
+              <a:t>Fig. 2</a:t>
+            </a:r>
+            <a:r>
+              <a:rPr lang="en-US" dirty="0"/>
+              <a:t>: “</a:t>
+            </a:r>
+            <a:r>
+              <a:rPr lang="en-US" dirty="0" err="1"/>
+              <a:t>DGIdb</a:t>
+            </a:r>
+            <a:r>
+              <a:rPr lang="en-US" dirty="0"/>
+              <a:t> 2.0: mining clinically relevant drug–gene </a:t>
+            </a:r>
+            <a:r>
+              <a:rPr lang="en-US" dirty="0" smtClean="0"/>
+              <a:t>interactions”</a:t>
+            </a:r>
+            <a:endParaRPr lang="en-US" dirty="0"/>
+          </a:p>
+        </p:txBody>
+      </p:sp>
+    </p:spTree>
+    <p:extLst>
+      <p:ext uri="{BB962C8B-B14F-4D97-AF65-F5344CB8AC3E}">
+        <p14:creationId xmlns:p14="http://schemas.microsoft.com/office/powerpoint/2010/main" val="3045472521"/>
+      </p:ext>
+    </p:extLst>
+  </p:cSld>
+  <p:clrMapOvr>
+    <a:masterClrMapping/>
+  </p:clrMapOvr>
+</p:sld>
+</file>
+
+<file path=ppt/slides/slide8.xml><?xml version="1.0" encoding="utf-8"?>
+<p:sld xmlns:a="http://schemas.openxmlformats.org/drawingml/2006/main" xmlns:r="http://schemas.openxmlformats.org/officeDocument/2006/relationships" xmlns:p="http://schemas.openxmlformats.org/presentationml/2006/main">
+  <p:cSld>
+    <p:spTree>
+      <p:nvGrpSpPr>
+        <p:cNvPr id="1" name=""/>
+        <p:cNvGrpSpPr/>
+        <p:nvPr/>
+      </p:nvGrpSpPr>
+      <p:grpSpPr>
+        <a:xfrm>
+          <a:off x="0" y="0"/>
+          <a:ext cx="0" cy="0"/>
+          <a:chOff x="0" y="0"/>
+          <a:chExt cx="0" cy="0"/>
+        </a:xfrm>
+      </p:grpSpPr>
+      <p:sp>
+        <p:nvSpPr>
+          <p:cNvPr id="2" name="Title 1"/>
+          <p:cNvSpPr>
+            <a:spLocks noGrp="1"/>
+          </p:cNvSpPr>
+          <p:nvPr>
+            <p:ph type="title"/>
+          </p:nvPr>
+        </p:nvSpPr>
+        <p:spPr/>
+        <p:txBody>
+          <a:bodyPr/>
+          <a:lstStyle/>
+          <a:p>
+            <a:r>
+              <a:rPr lang="en-US" dirty="0" err="1" smtClean="0"/>
+              <a:t>GenVisR</a:t>
+            </a:r>
+            <a:r>
+              <a:rPr lang="en-US" dirty="0" smtClean="0"/>
+              <a:t>::</a:t>
+            </a:r>
+            <a:r>
+              <a:rPr lang="en-US" dirty="0" err="1" smtClean="0"/>
+              <a:t>TvTi</a:t>
+            </a:r>
+            <a:r>
+              <a:rPr lang="en-US" dirty="0" smtClean="0"/>
+              <a:t>()</a:t>
+            </a:r>
+            <a:endParaRPr lang="en-US" dirty="0"/>
+          </a:p>
+        </p:txBody>
+      </p:sp>
+      <p:sp>
+        <p:nvSpPr>
+          <p:cNvPr id="3" name="Content Placeholder 2"/>
+          <p:cNvSpPr>
+            <a:spLocks noGrp="1"/>
+          </p:cNvSpPr>
+          <p:nvPr>
+            <p:ph idx="1"/>
+          </p:nvPr>
+        </p:nvSpPr>
+        <p:spPr/>
+        <p:txBody>
+          <a:bodyPr/>
+          <a:lstStyle/>
+          <a:p>
+            <a:r>
+              <a:rPr lang="en-US" dirty="0"/>
+              <a:t>What does it do?</a:t>
+            </a:r>
+          </a:p>
+          <a:p>
+            <a:pPr lvl="1"/>
+            <a:r>
+              <a:rPr lang="en-US" dirty="0"/>
+              <a:t>Visualize Transition and </a:t>
+            </a:r>
+            <a:r>
+              <a:rPr lang="en-US" dirty="0" err="1"/>
+              <a:t>Transversion</a:t>
+            </a:r>
+            <a:r>
+              <a:rPr lang="en-US" dirty="0"/>
+              <a:t> proportions</a:t>
+            </a:r>
+          </a:p>
+          <a:p>
+            <a:pPr lvl="1"/>
+            <a:r>
+              <a:rPr lang="en-US" dirty="0"/>
+              <a:t>Visualize Transition and </a:t>
+            </a:r>
+            <a:r>
+              <a:rPr lang="en-US" dirty="0" err="1"/>
+              <a:t>Transversion</a:t>
+            </a:r>
+            <a:r>
+              <a:rPr lang="en-US" dirty="0"/>
+              <a:t> frequencies</a:t>
+            </a:r>
+          </a:p>
+          <a:p>
+            <a:pPr lvl="1"/>
+            <a:r>
+              <a:rPr lang="en-US" dirty="0"/>
+              <a:t>Compare these proportions with expectations</a:t>
+            </a:r>
+          </a:p>
+          <a:p>
+            <a:r>
+              <a:rPr lang="en-US" dirty="0"/>
+              <a:t>Why do we care?</a:t>
+            </a:r>
+          </a:p>
+          <a:p>
+            <a:pPr lvl="1"/>
+            <a:r>
+              <a:rPr lang="en-US" dirty="0"/>
+              <a:t>Visualize mutation profile patterns</a:t>
+            </a:r>
+          </a:p>
+          <a:p>
+            <a:pPr lvl="2"/>
+            <a:r>
+              <a:rPr lang="en-US" dirty="0"/>
+              <a:t>Ex. Smoking tends to increase G -&gt; T/C -&gt; A </a:t>
+            </a:r>
+            <a:r>
+              <a:rPr lang="en-US" dirty="0" err="1"/>
+              <a:t>transversions</a:t>
+            </a:r>
+            <a:r>
+              <a:rPr lang="en-US" dirty="0"/>
+              <a:t> due to oxidative damage</a:t>
+            </a:r>
+          </a:p>
+          <a:p>
+            <a:pPr lvl="2"/>
+            <a:r>
+              <a:rPr lang="en-US" dirty="0"/>
+              <a:t>Practical application verify smoking status of patients with lung </a:t>
+            </a:r>
+            <a:r>
+              <a:rPr lang="en-US" dirty="0" smtClean="0"/>
+              <a:t>carcinomas</a:t>
+            </a:r>
+            <a:endParaRPr lang="en-US" dirty="0"/>
+          </a:p>
+        </p:txBody>
+      </p:sp>
+    </p:spTree>
+    <p:extLst>
+      <p:ext uri="{BB962C8B-B14F-4D97-AF65-F5344CB8AC3E}">
+        <p14:creationId xmlns:p14="http://schemas.microsoft.com/office/powerpoint/2010/main" val="2477007331"/>
+      </p:ext>
+    </p:extLst>
+  </p:cSld>
+  <p:clrMapOvr>
+    <a:masterClrMapping/>
+  </p:clrMapOvr>
+</p:sld>
+</file>
+
+<file path=ppt/slides/slide9.xml><?xml version="1.0" encoding="utf-8"?>
+<p:sld xmlns:a="http://schemas.openxmlformats.org/drawingml/2006/main" xmlns:r="http://schemas.openxmlformats.org/officeDocument/2006/relationships" xmlns:p="http://schemas.openxmlformats.org/presentationml/2006/main">
+  <p:cSld>
+    <p:spTree>
+      <p:nvGrpSpPr>
+        <p:cNvPr id="1" name=""/>
+        <p:cNvGrpSpPr/>
+        <p:nvPr/>
+      </p:nvGrpSpPr>
+      <p:grpSpPr>
+        <a:xfrm>
+          <a:off x="0" y="0"/>
+          <a:ext cx="0" cy="0"/>
+          <a:chOff x="0" y="0"/>
+          <a:chExt cx="0" cy="0"/>
+        </a:xfrm>
+      </p:grpSpPr>
+      <p:sp>
+        <p:nvSpPr>
+          <p:cNvPr id="2" name="Title 1"/>
+          <p:cNvSpPr>
+            <a:spLocks noGrp="1"/>
+          </p:cNvSpPr>
+          <p:nvPr>
+            <p:ph type="title"/>
+          </p:nvPr>
+        </p:nvSpPr>
+        <p:spPr/>
+        <p:txBody>
+          <a:bodyPr/>
+          <a:lstStyle/>
+          <a:p>
+            <a:r>
+              <a:rPr lang="en-US" dirty="0" err="1" smtClean="0"/>
+              <a:t>GenVisR</a:t>
+            </a:r>
+            <a:r>
+              <a:rPr lang="en-US" dirty="0" smtClean="0"/>
+              <a:t>::</a:t>
+            </a:r>
+            <a:r>
+              <a:rPr lang="en-US" dirty="0" err="1" smtClean="0"/>
+              <a:t>TvTi</a:t>
+            </a:r>
+            <a:r>
+              <a:rPr lang="en-US" dirty="0" smtClean="0"/>
+              <a:t>()</a:t>
+            </a:r>
+            <a:endParaRPr lang="en-US" dirty="0"/>
+          </a:p>
+        </p:txBody>
+      </p:sp>
+      <p:pic>
+        <p:nvPicPr>
+          <p:cNvPr id="10" name="Content Placeholder 9" descr="transition_transversion_v4.png"/>
+          <p:cNvPicPr>
+            <a:picLocks noGrp="1" noChangeAspect="1"/>
+          </p:cNvPicPr>
+          <p:nvPr>
+            <p:ph idx="1"/>
+          </p:nvPr>
+        </p:nvPicPr>
+        <p:blipFill>
+          <a:blip r:embed="rId3">
+            <a:extLst>
+              <a:ext uri="{28A0092B-C50C-407E-A947-70E740481C1C}">
+                <a14:useLocalDpi xmlns:a14="http://schemas.microsoft.com/office/drawing/2010/main" val="0"/>
+              </a:ext>
+            </a:extLst>
+          </a:blip>
+          <a:srcRect t="-9295" b="-9295"/>
+          <a:stretch>
+            <a:fillRect/>
+          </a:stretch>
+        </p:blipFill>
+        <p:spPr/>
+      </p:pic>
+      <p:sp>
+        <p:nvSpPr>
+          <p:cNvPr id="11" name="TextBox 10"/>
+          <p:cNvSpPr txBox="1"/>
+          <p:nvPr/>
+        </p:nvSpPr>
+        <p:spPr>
+          <a:xfrm>
+            <a:off x="0" y="6136722"/>
+            <a:ext cx="8862786" cy="646331"/>
+          </a:xfrm>
+          <a:prstGeom prst="rect">
+            <a:avLst/>
+          </a:prstGeom>
+          <a:noFill/>
+        </p:spPr>
+        <p:txBody>
+          <a:bodyPr wrap="square" rtlCol="0">
+            <a:spAutoFit/>
+          </a:bodyPr>
+          <a:lstStyle/>
+          <a:p>
+            <a:r>
+              <a:rPr lang="en-US" dirty="0"/>
+              <a:t>This research was originally published in Blood. </a:t>
+            </a:r>
+            <a:r>
+              <a:rPr lang="en-US" dirty="0" err="1"/>
+              <a:t>Krysiak</a:t>
+            </a:r>
+            <a:r>
+              <a:rPr lang="en-US" dirty="0"/>
+              <a:t> et al. Blood 2017 129:473-483 by </a:t>
+            </a:r>
+            <a:r>
+              <a:rPr lang="en-US" dirty="0" err="1"/>
+              <a:t>Krysiak</a:t>
+            </a:r>
+            <a:r>
+              <a:rPr lang="en-US" dirty="0"/>
+              <a:t> et al. licensed under © the American Society of Hematology</a:t>
+            </a:r>
+          </a:p>
+        </p:txBody>
+      </p:sp>
+    </p:spTree>
+    <p:extLst>
+      <p:ext uri="{BB962C8B-B14F-4D97-AF65-F5344CB8AC3E}">
+        <p14:creationId xmlns:p14="http://schemas.microsoft.com/office/powerpoint/2010/main" val="1887192775"/>
+      </p:ext>
+    </p:extLst>
+  </p:cSld>
+  <p:clrMapOvr>
+    <a:masterClrMapping/>
+  </p:clrMapOvr>
 </p:sld>
 </file>
 
@@ -3787,7 +5988,7 @@
   <a:extraClrSchemeLst/>
   <a:extLst>
     <a:ext uri="{05A4C25C-085E-4340-85A3-A5531E510DB2}">
-      <thm15:themeFamily xmlns:thm15="http://schemas.microsoft.com/office/thememl/2012/main" xmlns="" name="MGI_4-3_ratio_v1a" id="{9A0171FA-20F4-F840-B1C8-29D686AB0540}" vid="{60506783-C923-7847-B1CA-7C860CC95497}"/>
+      <thm15:themeFamily xmlns="" xmlns:thm15="http://schemas.microsoft.com/office/thememl/2012/main" name="MGI_4-3_ratio_v1a" id="{9A0171FA-20F4-F840-B1C8-29D686AB0540}" vid="{60506783-C923-7847-B1CA-7C860CC95497}"/>
     </a:ext>
   </a:extLst>
 </a:theme>

</xml_diff>